<commit_message>
Added notes to slide 61 constructs an empty arraylist
</commit_message>
<xml_diff>
--- a/curriculum/Unit4/Unit4.pptx
+++ b/curriculum/Unit4/Unit4.pptx
@@ -285,7 +285,7 @@
           <a:p>
             <a:fld id="{7392D755-E836-4051-AB66-2F6109A7111F}" type="datetimeFigureOut">
               <a:rPr lang="en-US" smtClean="0"/>
-              <a:t>8/31/2016</a:t>
+              <a:t>11/19/2019</a:t>
             </a:fld>
             <a:endParaRPr lang="en-US"/>
           </a:p>
@@ -680,18 +680,174 @@
           <a:bodyPr/>
           <a:lstStyle/>
           <a:p>
-            <a:r>
-              <a:rPr lang="en-US" dirty="0"/>
-              <a:t>This</a:t>
-            </a:r>
-            <a:r>
-              <a:rPr lang="en-US" baseline="0" dirty="0"/>
-              <a:t> unit is mostly done either on practice it or the board. Feel free to edit </a:t>
-            </a:r>
-            <a:r>
-              <a:rPr lang="en-US" baseline="0"/>
-              <a:t>this slide deck as you see fit!</a:t>
-            </a:r>
+            <a:pPr marL="0" marR="0" lvl="0" indent="0" algn="l" defTabSz="914400" rtl="0" eaLnBrk="1" fontAlgn="auto" latinLnBrk="0" hangingPunct="1">
+              <a:lnSpc>
+                <a:spcPct val="100000"/>
+              </a:lnSpc>
+              <a:spcBef>
+                <a:spcPts val="0"/>
+              </a:spcBef>
+              <a:spcAft>
+                <a:spcPts val="0"/>
+              </a:spcAft>
+              <a:buClrTx/>
+              <a:buSzTx/>
+              <a:buFontTx/>
+              <a:buNone/>
+              <a:tabLst/>
+              <a:defRPr/>
+            </a:pPr>
+            <a:r>
+              <a:rPr lang="en-US" sz="1200" dirty="0">
+                <a:latin typeface="Courier New" panose="02070309020205020404" pitchFamily="49" charset="0"/>
+                <a:cs typeface="Courier New" panose="02070309020205020404" pitchFamily="49" charset="0"/>
+              </a:rPr>
+              <a:t>The following line </a:t>
+            </a:r>
+            <a:r>
+              <a:rPr lang="en-US" sz="1200">
+                <a:latin typeface="Courier New" panose="02070309020205020404" pitchFamily="49" charset="0"/>
+                <a:cs typeface="Courier New" panose="02070309020205020404" pitchFamily="49" charset="0"/>
+              </a:rPr>
+              <a:t>of code constructs </a:t>
+            </a:r>
+            <a:r>
+              <a:rPr lang="en-US" sz="1200" dirty="0">
+                <a:latin typeface="Courier New" panose="02070309020205020404" pitchFamily="49" charset="0"/>
+                <a:cs typeface="Courier New" panose="02070309020205020404" pitchFamily="49" charset="0"/>
+              </a:rPr>
+              <a:t>an </a:t>
+            </a:r>
+            <a:r>
+              <a:rPr lang="en-US" sz="1200">
+                <a:latin typeface="Courier New" panose="02070309020205020404" pitchFamily="49" charset="0"/>
+                <a:cs typeface="Courier New" panose="02070309020205020404" pitchFamily="49" charset="0"/>
+              </a:rPr>
+              <a:t>empty list:</a:t>
+            </a:r>
+            <a:endParaRPr lang="en-US" sz="1200" dirty="0">
+              <a:latin typeface="Courier New" panose="02070309020205020404" pitchFamily="49" charset="0"/>
+              <a:cs typeface="Courier New" panose="02070309020205020404" pitchFamily="49" charset="0"/>
+            </a:endParaRPr>
+          </a:p>
+          <a:p>
+            <a:pPr marL="0" marR="0" lvl="0" indent="0" algn="l" defTabSz="914400" rtl="0" eaLnBrk="1" fontAlgn="auto" latinLnBrk="0" hangingPunct="1">
+              <a:lnSpc>
+                <a:spcPct val="100000"/>
+              </a:lnSpc>
+              <a:spcBef>
+                <a:spcPts val="0"/>
+              </a:spcBef>
+              <a:spcAft>
+                <a:spcPts val="0"/>
+              </a:spcAft>
+              <a:buClrTx/>
+              <a:buSzTx/>
+              <a:buFontTx/>
+              <a:buNone/>
+              <a:tabLst/>
+              <a:defRPr/>
+            </a:pPr>
+            <a:r>
+              <a:rPr lang="en-US" sz="1200" dirty="0" err="1">
+                <a:latin typeface="Courier New" panose="02070309020205020404" pitchFamily="49" charset="0"/>
+                <a:cs typeface="Courier New" panose="02070309020205020404" pitchFamily="49" charset="0"/>
+              </a:rPr>
+              <a:t>ArrayList</a:t>
+            </a:r>
+            <a:r>
+              <a:rPr lang="en-US" sz="1200" dirty="0">
+                <a:latin typeface="Courier New" panose="02070309020205020404" pitchFamily="49" charset="0"/>
+                <a:cs typeface="Courier New" panose="02070309020205020404" pitchFamily="49" charset="0"/>
+              </a:rPr>
+              <a:t>&lt;String&gt; </a:t>
+            </a:r>
+            <a:r>
+              <a:rPr lang="en-US" sz="1200" dirty="0" err="1">
+                <a:latin typeface="Courier New" panose="02070309020205020404" pitchFamily="49" charset="0"/>
+                <a:cs typeface="Courier New" panose="02070309020205020404" pitchFamily="49" charset="0"/>
+              </a:rPr>
+              <a:t>spongebob</a:t>
+            </a:r>
+            <a:r>
+              <a:rPr lang="en-US" sz="1200" dirty="0">
+                <a:latin typeface="Courier New" panose="02070309020205020404" pitchFamily="49" charset="0"/>
+                <a:cs typeface="Courier New" panose="02070309020205020404" pitchFamily="49" charset="0"/>
+              </a:rPr>
+              <a:t> = new </a:t>
+            </a:r>
+            <a:r>
+              <a:rPr lang="en-US" sz="1200" dirty="0" err="1">
+                <a:latin typeface="Courier New" panose="02070309020205020404" pitchFamily="49" charset="0"/>
+                <a:cs typeface="Courier New" panose="02070309020205020404" pitchFamily="49" charset="0"/>
+              </a:rPr>
+              <a:t>ArrayList</a:t>
+            </a:r>
+            <a:r>
+              <a:rPr lang="en-US" sz="1200" dirty="0">
+                <a:latin typeface="Courier New" panose="02070309020205020404" pitchFamily="49" charset="0"/>
+                <a:cs typeface="Courier New" panose="02070309020205020404" pitchFamily="49" charset="0"/>
+              </a:rPr>
+              <a:t>&lt;String&gt;(); </a:t>
+            </a:r>
+          </a:p>
+          <a:p>
+            <a:pPr marL="0" marR="0" lvl="0" indent="0" algn="l" defTabSz="914400" rtl="0" eaLnBrk="1" fontAlgn="auto" latinLnBrk="0" hangingPunct="1">
+              <a:lnSpc>
+                <a:spcPct val="100000"/>
+              </a:lnSpc>
+              <a:spcBef>
+                <a:spcPts val="0"/>
+              </a:spcBef>
+              <a:spcAft>
+                <a:spcPts val="0"/>
+              </a:spcAft>
+              <a:buClrTx/>
+              <a:buSzTx/>
+              <a:buFontTx/>
+              <a:buNone/>
+              <a:tabLst/>
+              <a:defRPr/>
+            </a:pPr>
+            <a:endParaRPr lang="en-US" sz="1200" dirty="0">
+              <a:latin typeface="Courier New" panose="02070309020205020404" pitchFamily="49" charset="0"/>
+              <a:cs typeface="Courier New" panose="02070309020205020404" pitchFamily="49" charset="0"/>
+            </a:endParaRPr>
+          </a:p>
+          <a:p>
+            <a:pPr marL="0" marR="0" lvl="0" indent="0" algn="l" defTabSz="914400" rtl="0" eaLnBrk="1" fontAlgn="auto" latinLnBrk="0" hangingPunct="1">
+              <a:lnSpc>
+                <a:spcPct val="100000"/>
+              </a:lnSpc>
+              <a:spcBef>
+                <a:spcPts val="0"/>
+              </a:spcBef>
+              <a:spcAft>
+                <a:spcPts val="0"/>
+              </a:spcAft>
+              <a:buClrTx/>
+              <a:buSzTx/>
+              <a:buFontTx/>
+              <a:buNone/>
+              <a:tabLst/>
+              <a:defRPr/>
+            </a:pPr>
+            <a:r>
+              <a:rPr lang="en-US" sz="1200" dirty="0" err="1">
+                <a:latin typeface="Courier New" panose="02070309020205020404" pitchFamily="49" charset="0"/>
+                <a:cs typeface="Courier New" panose="02070309020205020404" pitchFamily="49" charset="0"/>
+              </a:rPr>
+              <a:t>spongebob.size</a:t>
+            </a:r>
+            <a:r>
+              <a:rPr lang="en-US" sz="1200" dirty="0">
+                <a:latin typeface="Courier New" panose="02070309020205020404" pitchFamily="49" charset="0"/>
+                <a:cs typeface="Courier New" panose="02070309020205020404" pitchFamily="49" charset="0"/>
+              </a:rPr>
+              <a:t>() returns 0</a:t>
+            </a:r>
+          </a:p>
+          <a:p>
             <a:endParaRPr lang="en-US" dirty="0"/>
           </a:p>
         </p:txBody>
@@ -703,7 +859,7 @@
             <a:spLocks noGrp="1"/>
           </p:cNvSpPr>
           <p:nvPr>
-            <p:ph type="sldNum" sz="quarter" idx="10"/>
+            <p:ph type="sldNum" sz="quarter" idx="5"/>
           </p:nvPr>
         </p:nvSpPr>
         <p:spPr/>
@@ -711,9 +867,9 @@
           <a:bodyPr/>
           <a:lstStyle/>
           <a:p>
-            <a:fld id="{C56969A0-B3EA-45A4-A390-44554200A62E}" type="slidenum">
+            <a:fld id="{1D7DF5D0-C7A8-4BCA-9DD2-4CE2E72450A9}" type="slidenum">
               <a:rPr lang="en-US" smtClean="0"/>
-              <a:t>68</a:t>
+              <a:t>61</a:t>
             </a:fld>
             <a:endParaRPr lang="en-US"/>
           </a:p>
@@ -722,7 +878,7 @@
     </p:spTree>
     <p:extLst>
       <p:ext uri="{BB962C8B-B14F-4D97-AF65-F5344CB8AC3E}">
-        <p14:creationId xmlns:p14="http://schemas.microsoft.com/office/powerpoint/2010/main" val="1578483572"/>
+        <p14:creationId xmlns:p14="http://schemas.microsoft.com/office/powerpoint/2010/main" val="465194056"/>
       </p:ext>
     </p:extLst>
   </p:cSld>
@@ -809,6 +965,102 @@
           <a:p>
             <a:fld id="{C56969A0-B3EA-45A4-A390-44554200A62E}" type="slidenum">
               <a:rPr lang="en-US" smtClean="0"/>
+              <a:t>68</a:t>
+            </a:fld>
+            <a:endParaRPr lang="en-US"/>
+          </a:p>
+        </p:txBody>
+      </p:sp>
+    </p:spTree>
+    <p:extLst>
+      <p:ext uri="{BB962C8B-B14F-4D97-AF65-F5344CB8AC3E}">
+        <p14:creationId xmlns:p14="http://schemas.microsoft.com/office/powerpoint/2010/main" val="1578483572"/>
+      </p:ext>
+    </p:extLst>
+  </p:cSld>
+  <p:clrMapOvr>
+    <a:masterClrMapping/>
+  </p:clrMapOvr>
+</p:notes>
+</file>
+
+<file path=ppt/notesSlides/notesSlide12.xml><?xml version="1.0" encoding="utf-8"?>
+<p:notes xmlns:a="http://schemas.openxmlformats.org/drawingml/2006/main" xmlns:r="http://schemas.openxmlformats.org/officeDocument/2006/relationships" xmlns:p="http://schemas.openxmlformats.org/presentationml/2006/main">
+  <p:cSld>
+    <p:spTree>
+      <p:nvGrpSpPr>
+        <p:cNvPr id="1" name=""/>
+        <p:cNvGrpSpPr/>
+        <p:nvPr/>
+      </p:nvGrpSpPr>
+      <p:grpSpPr>
+        <a:xfrm>
+          <a:off x="0" y="0"/>
+          <a:ext cx="0" cy="0"/>
+          <a:chOff x="0" y="0"/>
+          <a:chExt cx="0" cy="0"/>
+        </a:xfrm>
+      </p:grpSpPr>
+      <p:sp>
+        <p:nvSpPr>
+          <p:cNvPr id="2" name="Slide Image Placeholder 1"/>
+          <p:cNvSpPr>
+            <a:spLocks noGrp="1" noRot="1" noChangeAspect="1"/>
+          </p:cNvSpPr>
+          <p:nvPr>
+            <p:ph type="sldImg"/>
+          </p:nvPr>
+        </p:nvSpPr>
+        <p:spPr/>
+      </p:sp>
+      <p:sp>
+        <p:nvSpPr>
+          <p:cNvPr id="3" name="Notes Placeholder 2"/>
+          <p:cNvSpPr>
+            <a:spLocks noGrp="1"/>
+          </p:cNvSpPr>
+          <p:nvPr>
+            <p:ph type="body" idx="1"/>
+          </p:nvPr>
+        </p:nvSpPr>
+        <p:spPr/>
+        <p:txBody>
+          <a:bodyPr/>
+          <a:lstStyle/>
+          <a:p>
+            <a:r>
+              <a:rPr lang="en-US" dirty="0"/>
+              <a:t>This</a:t>
+            </a:r>
+            <a:r>
+              <a:rPr lang="en-US" baseline="0" dirty="0"/>
+              <a:t> unit is mostly done either on practice it or the board. Feel free to edit </a:t>
+            </a:r>
+            <a:r>
+              <a:rPr lang="en-US" baseline="0"/>
+              <a:t>this slide deck as you see fit!</a:t>
+            </a:r>
+            <a:endParaRPr lang="en-US" dirty="0"/>
+          </a:p>
+        </p:txBody>
+      </p:sp>
+      <p:sp>
+        <p:nvSpPr>
+          <p:cNvPr id="4" name="Slide Number Placeholder 3"/>
+          <p:cNvSpPr>
+            <a:spLocks noGrp="1"/>
+          </p:cNvSpPr>
+          <p:nvPr>
+            <p:ph type="sldNum" sz="quarter" idx="10"/>
+          </p:nvPr>
+        </p:nvSpPr>
+        <p:spPr/>
+        <p:txBody>
+          <a:bodyPr/>
+          <a:lstStyle/>
+          <a:p>
+            <a:fld id="{C56969A0-B3EA-45A4-A390-44554200A62E}" type="slidenum">
+              <a:rPr lang="en-US" smtClean="0"/>
               <a:t>72</a:t>
             </a:fld>
             <a:endParaRPr lang="en-US"/>
@@ -828,7 +1080,7 @@
 </p:notes>
 </file>
 
-<file path=ppt/notesSlides/notesSlide12.xml><?xml version="1.0" encoding="utf-8"?>
+<file path=ppt/notesSlides/notesSlide13.xml><?xml version="1.0" encoding="utf-8"?>
 <p:notes xmlns:a="http://schemas.openxmlformats.org/drawingml/2006/main" xmlns:r="http://schemas.openxmlformats.org/officeDocument/2006/relationships" xmlns:p="http://schemas.openxmlformats.org/presentationml/2006/main">
   <p:cSld>
     <p:spTree>
@@ -1716,7 +1968,7 @@
           <a:p>
             <a:fld id="{A70EB186-EB06-4AD4-B0FF-B396B68ED702}" type="datetimeFigureOut">
               <a:rPr lang="en-US" smtClean="0"/>
-              <a:t>8/31/2016</a:t>
+              <a:t>11/19/2019</a:t>
             </a:fld>
             <a:endParaRPr lang="en-US"/>
           </a:p>
@@ -1884,7 +2136,7 @@
           <a:p>
             <a:fld id="{A70EB186-EB06-4AD4-B0FF-B396B68ED702}" type="datetimeFigureOut">
               <a:rPr lang="en-US" smtClean="0"/>
-              <a:t>8/31/2016</a:t>
+              <a:t>11/19/2019</a:t>
             </a:fld>
             <a:endParaRPr lang="en-US"/>
           </a:p>
@@ -2062,7 +2314,7 @@
           <a:p>
             <a:fld id="{A70EB186-EB06-4AD4-B0FF-B396B68ED702}" type="datetimeFigureOut">
               <a:rPr lang="en-US" smtClean="0"/>
-              <a:t>8/31/2016</a:t>
+              <a:t>11/19/2019</a:t>
             </a:fld>
             <a:endParaRPr lang="en-US"/>
           </a:p>
@@ -2230,7 +2482,7 @@
           <a:p>
             <a:fld id="{A70EB186-EB06-4AD4-B0FF-B396B68ED702}" type="datetimeFigureOut">
               <a:rPr lang="en-US" smtClean="0"/>
-              <a:t>8/31/2016</a:t>
+              <a:t>11/19/2019</a:t>
             </a:fld>
             <a:endParaRPr lang="en-US"/>
           </a:p>
@@ -2475,7 +2727,7 @@
           <a:p>
             <a:fld id="{A70EB186-EB06-4AD4-B0FF-B396B68ED702}" type="datetimeFigureOut">
               <a:rPr lang="en-US" smtClean="0"/>
-              <a:t>8/31/2016</a:t>
+              <a:t>11/19/2019</a:t>
             </a:fld>
             <a:endParaRPr lang="en-US"/>
           </a:p>
@@ -2704,7 +2956,7 @@
           <a:p>
             <a:fld id="{A70EB186-EB06-4AD4-B0FF-B396B68ED702}" type="datetimeFigureOut">
               <a:rPr lang="en-US" smtClean="0"/>
-              <a:t>8/31/2016</a:t>
+              <a:t>11/19/2019</a:t>
             </a:fld>
             <a:endParaRPr lang="en-US"/>
           </a:p>
@@ -3068,7 +3320,7 @@
           <a:p>
             <a:fld id="{A70EB186-EB06-4AD4-B0FF-B396B68ED702}" type="datetimeFigureOut">
               <a:rPr lang="en-US" smtClean="0"/>
-              <a:t>8/31/2016</a:t>
+              <a:t>11/19/2019</a:t>
             </a:fld>
             <a:endParaRPr lang="en-US"/>
           </a:p>
@@ -3185,7 +3437,7 @@
           <a:p>
             <a:fld id="{A70EB186-EB06-4AD4-B0FF-B396B68ED702}" type="datetimeFigureOut">
               <a:rPr lang="en-US" smtClean="0"/>
-              <a:t>8/31/2016</a:t>
+              <a:t>11/19/2019</a:t>
             </a:fld>
             <a:endParaRPr lang="en-US"/>
           </a:p>
@@ -3280,7 +3532,7 @@
           <a:p>
             <a:fld id="{A70EB186-EB06-4AD4-B0FF-B396B68ED702}" type="datetimeFigureOut">
               <a:rPr lang="en-US" smtClean="0"/>
-              <a:t>8/31/2016</a:t>
+              <a:t>11/19/2019</a:t>
             </a:fld>
             <a:endParaRPr lang="en-US"/>
           </a:p>
@@ -3555,7 +3807,7 @@
           <a:p>
             <a:fld id="{A70EB186-EB06-4AD4-B0FF-B396B68ED702}" type="datetimeFigureOut">
               <a:rPr lang="en-US" smtClean="0"/>
-              <a:t>8/31/2016</a:t>
+              <a:t>11/19/2019</a:t>
             </a:fld>
             <a:endParaRPr lang="en-US"/>
           </a:p>
@@ -3807,7 +4059,7 @@
           <a:p>
             <a:fld id="{A70EB186-EB06-4AD4-B0FF-B396B68ED702}" type="datetimeFigureOut">
               <a:rPr lang="en-US" smtClean="0"/>
-              <a:t>8/31/2016</a:t>
+              <a:t>11/19/2019</a:t>
             </a:fld>
             <a:endParaRPr lang="en-US"/>
           </a:p>
@@ -4018,7 +4270,7 @@
           <a:p>
             <a:fld id="{A70EB186-EB06-4AD4-B0FF-B396B68ED702}" type="datetimeFigureOut">
               <a:rPr lang="en-US" smtClean="0"/>
-              <a:t>8/31/2016</a:t>
+              <a:t>11/19/2019</a:t>
             </a:fld>
             <a:endParaRPr lang="en-US"/>
           </a:p>
@@ -6552,9 +6804,7 @@
           <p:cNvGraphicFramePr>
             <a:graphicFrameLocks noGrp="1"/>
           </p:cNvGraphicFramePr>
-          <p:nvPr>
-            <p:extLst/>
-          </p:nvPr>
+          <p:nvPr/>
         </p:nvGraphicFramePr>
         <p:xfrm>
           <a:off x="2655188" y="4195762"/>
@@ -10832,7 +11082,7 @@
               </a:ln>
               <a:extLst>
                 <a:ext uri="{909E8E84-426E-40dd-AFC4-6F175D3DCCD1}">
-                  <a14:hiddenFill xmlns:a14="http://schemas.microsoft.com/office/drawing/2010/main" xmlns="">
+                  <a14:hiddenFill xmlns="" xmlns:a14="http://schemas.microsoft.com/office/drawing/2010/main">
                     <a:noFill/>
                   </a14:hiddenFill>
                 </a:ext>
@@ -10873,7 +11123,7 @@
               </a:ln>
               <a:extLst>
                 <a:ext uri="{909E8E84-426E-40dd-AFC4-6F175D3DCCD1}">
-                  <a14:hiddenFill xmlns:a14="http://schemas.microsoft.com/office/drawing/2010/main" xmlns="">
+                  <a14:hiddenFill xmlns="" xmlns:a14="http://schemas.microsoft.com/office/drawing/2010/main">
                     <a:solidFill>
                       <a:srgbClr val="FFFFFF"/>
                     </a:solidFill>
@@ -11038,7 +11288,7 @@
               </a:ln>
               <a:extLst>
                 <a:ext uri="{909E8E84-426E-40dd-AFC4-6F175D3DCCD1}">
-                  <a14:hiddenFill xmlns:a14="http://schemas.microsoft.com/office/drawing/2010/main" xmlns="">
+                  <a14:hiddenFill xmlns="" xmlns:a14="http://schemas.microsoft.com/office/drawing/2010/main">
                     <a:noFill/>
                   </a14:hiddenFill>
                 </a:ext>
@@ -11079,7 +11329,7 @@
               </a:ln>
               <a:extLst>
                 <a:ext uri="{909E8E84-426E-40dd-AFC4-6F175D3DCCD1}">
-                  <a14:hiddenFill xmlns:a14="http://schemas.microsoft.com/office/drawing/2010/main" xmlns="">
+                  <a14:hiddenFill xmlns="" xmlns:a14="http://schemas.microsoft.com/office/drawing/2010/main">
                     <a:solidFill>
                       <a:srgbClr val="FFFFFF"/>
                     </a:solidFill>
@@ -11244,7 +11494,7 @@
               </a:ln>
               <a:extLst>
                 <a:ext uri="{909E8E84-426E-40dd-AFC4-6F175D3DCCD1}">
-                  <a14:hiddenFill xmlns:a14="http://schemas.microsoft.com/office/drawing/2010/main" xmlns="">
+                  <a14:hiddenFill xmlns="" xmlns:a14="http://schemas.microsoft.com/office/drawing/2010/main">
                     <a:noFill/>
                   </a14:hiddenFill>
                 </a:ext>
@@ -11285,7 +11535,7 @@
               </a:ln>
               <a:extLst>
                 <a:ext uri="{909E8E84-426E-40dd-AFC4-6F175D3DCCD1}">
-                  <a14:hiddenFill xmlns:a14="http://schemas.microsoft.com/office/drawing/2010/main" xmlns="">
+                  <a14:hiddenFill xmlns="" xmlns:a14="http://schemas.microsoft.com/office/drawing/2010/main">
                     <a:solidFill>
                       <a:srgbClr val="FFFFFF"/>
                     </a:solidFill>
@@ -11675,9 +11925,7 @@
           <p:cNvGraphicFramePr>
             <a:graphicFrameLocks noGrp="1"/>
           </p:cNvGraphicFramePr>
-          <p:nvPr>
-            <p:extLst/>
-          </p:nvPr>
+          <p:nvPr/>
         </p:nvGraphicFramePr>
         <p:xfrm>
           <a:off x="2970510" y="4228454"/>
@@ -26180,9 +26428,7 @@
           <p:cNvGraphicFramePr>
             <a:graphicFrameLocks noGrp="1"/>
           </p:cNvGraphicFramePr>
-          <p:nvPr>
-            <p:extLst/>
-          </p:nvPr>
+          <p:nvPr/>
         </p:nvGraphicFramePr>
         <p:xfrm>
           <a:off x="2286001" y="3429000"/>
@@ -32073,9 +32319,7 @@
           <p:cNvGraphicFramePr>
             <a:graphicFrameLocks noGrp="1"/>
           </p:cNvGraphicFramePr>
-          <p:nvPr>
-            <p:extLst/>
-          </p:nvPr>
+          <p:nvPr/>
         </p:nvGraphicFramePr>
         <p:xfrm>
           <a:off x="3048000" y="4648200"/>
@@ -39040,9 +39284,7 @@
           <p:cNvGraphicFramePr>
             <a:graphicFrameLocks noGrp="1"/>
           </p:cNvGraphicFramePr>
-          <p:nvPr>
-            <p:extLst/>
-          </p:nvPr>
+          <p:nvPr/>
         </p:nvGraphicFramePr>
         <p:xfrm>
           <a:off x="2590218" y="2405576"/>
@@ -39237,9 +39479,7 @@
           <p:cNvGraphicFramePr>
             <a:graphicFrameLocks noGrp="1"/>
           </p:cNvGraphicFramePr>
-          <p:nvPr>
-            <p:extLst/>
-          </p:nvPr>
+          <p:nvPr/>
         </p:nvGraphicFramePr>
         <p:xfrm>
           <a:off x="2590214" y="3774756"/>
@@ -39777,9 +40017,7 @@
           <p:cNvGraphicFramePr>
             <a:graphicFrameLocks noGrp="1"/>
           </p:cNvGraphicFramePr>
-          <p:nvPr>
-            <p:extLst/>
-          </p:nvPr>
+          <p:nvPr/>
         </p:nvGraphicFramePr>
         <p:xfrm>
           <a:off x="2590214" y="2700996"/>
@@ -44236,12 +44474,21 @@
 </file>
 
 <file path=customXml/item1.xml><?xml version="1.0" encoding="utf-8"?>
+<?mso-contentType ?>
+<FormTemplates xmlns="http://schemas.microsoft.com/sharepoint/v3/contenttype/forms">
+  <Display>DocumentLibraryForm</Display>
+  <Edit>DocumentLibraryForm</Edit>
+  <New>DocumentLibraryForm</New>
+</FormTemplates>
+</file>
+
+<file path=customXml/item2.xml><?xml version="1.0" encoding="utf-8"?>
 <p:properties xmlns:p="http://schemas.microsoft.com/office/2006/metadata/properties" xmlns:xsi="http://www.w3.org/2001/XMLSchema-instance" xmlns:pc="http://schemas.microsoft.com/office/infopath/2007/PartnerControls">
   <documentManagement/>
 </p:properties>
 </file>
 
-<file path=customXml/item2.xml><?xml version="1.0" encoding="utf-8"?>
+<file path=customXml/item3.xml><?xml version="1.0" encoding="utf-8"?>
 <ct:contentTypeSchema xmlns:ct="http://schemas.microsoft.com/office/2006/metadata/contentType" xmlns:ma="http://schemas.microsoft.com/office/2006/metadata/properties/metaAttributes" ct:_="" ma:_="" ma:contentTypeName="Document" ma:contentTypeID="0x010100BABADD3A0624AA4E97287821B8F4D7D6" ma:contentTypeVersion="3" ma:contentTypeDescription="Create a new document." ma:contentTypeScope="" ma:versionID="d1f55a70bd1930e0ae5c5588ea58d234">
   <xsd:schema xmlns:xsd="http://www.w3.org/2001/XMLSchema" xmlns:xs="http://www.w3.org/2001/XMLSchema" xmlns:p="http://schemas.microsoft.com/office/2006/metadata/properties" xmlns:ns2="5edd459b-714d-42ed-b78f-512da7d1c14e" targetNamespace="http://schemas.microsoft.com/office/2006/metadata/properties" ma:root="true" ma:fieldsID="5a6a6e2895642296b7d1775ae73bc200" ns2:_="">
     <xsd:import namespace="5edd459b-714d-42ed-b78f-512da7d1c14e"/>
@@ -44395,16 +44642,15 @@
 </ct:contentTypeSchema>
 </file>
 
-<file path=customXml/item3.xml><?xml version="1.0" encoding="utf-8"?>
-<?mso-contentType ?>
-<FormTemplates xmlns="http://schemas.microsoft.com/sharepoint/v3/contenttype/forms">
-  <Display>DocumentLibraryForm</Display>
-  <Edit>DocumentLibraryForm</Edit>
-  <New>DocumentLibraryForm</New>
-</FormTemplates>
+<file path=customXml/itemProps1.xml><?xml version="1.0" encoding="utf-8"?>
+<ds:datastoreItem xmlns:ds="http://schemas.openxmlformats.org/officeDocument/2006/customXml" ds:itemID="{7214D5E7-D1A3-4AD8-9DF2-B5EBCFE58B85}">
+  <ds:schemaRefs>
+    <ds:schemaRef ds:uri="http://schemas.microsoft.com/sharepoint/v3/contenttype/forms"/>
+  </ds:schemaRefs>
+</ds:datastoreItem>
 </file>
 
-<file path=customXml/itemProps1.xml><?xml version="1.0" encoding="utf-8"?>
+<file path=customXml/itemProps2.xml><?xml version="1.0" encoding="utf-8"?>
 <ds:datastoreItem xmlns:ds="http://schemas.openxmlformats.org/officeDocument/2006/customXml" ds:itemID="{1FC66F77-93BD-41FC-BCD6-478E52446EDA}">
   <ds:schemaRefs>
     <ds:schemaRef ds:uri="5edd459b-714d-42ed-b78f-512da7d1c14e"/>
@@ -44420,7 +44666,7 @@
 </ds:datastoreItem>
 </file>
 
-<file path=customXml/itemProps2.xml><?xml version="1.0" encoding="utf-8"?>
+<file path=customXml/itemProps3.xml><?xml version="1.0" encoding="utf-8"?>
 <ds:datastoreItem xmlns:ds="http://schemas.openxmlformats.org/officeDocument/2006/customXml" ds:itemID="{6D92D80B-5E3D-4520-BB40-B82F31EFEAAA}">
   <ds:schemaRefs>
     <ds:schemaRef ds:uri="http://schemas.microsoft.com/office/2006/metadata/contentType"/>
@@ -44436,12 +44682,4 @@
     <ds:schemaRef ds:uri="http://schemas.microsoft.com/internal/obd"/>
   </ds:schemaRefs>
 </ds:datastoreItem>
-</file>
-
-<file path=customXml/itemProps3.xml><?xml version="1.0" encoding="utf-8"?>
-<ds:datastoreItem xmlns:ds="http://schemas.openxmlformats.org/officeDocument/2006/customXml" ds:itemID="{7214D5E7-D1A3-4AD8-9DF2-B5EBCFE58B85}">
-  <ds:schemaRefs>
-    <ds:schemaRef ds:uri="http://schemas.microsoft.com/sharepoint/v3/contenttype/forms"/>
-  </ds:schemaRefs>
-</ds:datastoreItem>
 </file>
</xml_diff>

<commit_message>
Add initialization of double arrays, slide 58
</commit_message>
<xml_diff>
--- a/curriculum/Unit4/Unit4.pptx
+++ b/curriculum/Unit4/Unit4.pptx
@@ -5,7 +5,7 @@
     <p:sldMasterId id="2147483648" r:id="rId4"/>
   </p:sldMasterIdLst>
   <p:notesMasterIdLst>
-    <p:notesMasterId r:id="rId83"/>
+    <p:notesMasterId r:id="rId84"/>
   </p:notesMasterIdLst>
   <p:sldIdLst>
     <p:sldId id="256" r:id="rId5"/>
@@ -66,26 +66,27 @@
     <p:sldId id="311" r:id="rId60"/>
     <p:sldId id="312" r:id="rId61"/>
     <p:sldId id="313" r:id="rId62"/>
-    <p:sldId id="314" r:id="rId63"/>
-    <p:sldId id="315" r:id="rId64"/>
-    <p:sldId id="316" r:id="rId65"/>
-    <p:sldId id="317" r:id="rId66"/>
-    <p:sldId id="318" r:id="rId67"/>
-    <p:sldId id="319" r:id="rId68"/>
-    <p:sldId id="320" r:id="rId69"/>
-    <p:sldId id="321" r:id="rId70"/>
-    <p:sldId id="322" r:id="rId71"/>
-    <p:sldId id="323" r:id="rId72"/>
-    <p:sldId id="324" r:id="rId73"/>
-    <p:sldId id="325" r:id="rId74"/>
-    <p:sldId id="326" r:id="rId75"/>
-    <p:sldId id="327" r:id="rId76"/>
-    <p:sldId id="328" r:id="rId77"/>
-    <p:sldId id="329" r:id="rId78"/>
-    <p:sldId id="330" r:id="rId79"/>
-    <p:sldId id="331" r:id="rId80"/>
-    <p:sldId id="332" r:id="rId81"/>
-    <p:sldId id="333" r:id="rId82"/>
+    <p:sldId id="334" r:id="rId63"/>
+    <p:sldId id="314" r:id="rId64"/>
+    <p:sldId id="315" r:id="rId65"/>
+    <p:sldId id="316" r:id="rId66"/>
+    <p:sldId id="317" r:id="rId67"/>
+    <p:sldId id="318" r:id="rId68"/>
+    <p:sldId id="319" r:id="rId69"/>
+    <p:sldId id="320" r:id="rId70"/>
+    <p:sldId id="321" r:id="rId71"/>
+    <p:sldId id="322" r:id="rId72"/>
+    <p:sldId id="323" r:id="rId73"/>
+    <p:sldId id="324" r:id="rId74"/>
+    <p:sldId id="325" r:id="rId75"/>
+    <p:sldId id="326" r:id="rId76"/>
+    <p:sldId id="327" r:id="rId77"/>
+    <p:sldId id="328" r:id="rId78"/>
+    <p:sldId id="329" r:id="rId79"/>
+    <p:sldId id="330" r:id="rId80"/>
+    <p:sldId id="331" r:id="rId81"/>
+    <p:sldId id="332" r:id="rId82"/>
+    <p:sldId id="333" r:id="rId83"/>
   </p:sldIdLst>
   <p:sldSz cx="12192000" cy="6858000"/>
   <p:notesSz cx="6858000" cy="9144000"/>
@@ -285,7 +286,7 @@
           <a:p>
             <a:fld id="{7392D755-E836-4051-AB66-2F6109A7111F}" type="datetimeFigureOut">
               <a:rPr lang="en-US" smtClean="0"/>
-              <a:t>11/19/2019</a:t>
+              <a:t>12/2/2019</a:t>
             </a:fld>
             <a:endParaRPr lang="en-US"/>
           </a:p>
@@ -869,7 +870,7 @@
           <a:p>
             <a:fld id="{1D7DF5D0-C7A8-4BCA-9DD2-4CE2E72450A9}" type="slidenum">
               <a:rPr lang="en-US" smtClean="0"/>
-              <a:t>61</a:t>
+              <a:t>62</a:t>
             </a:fld>
             <a:endParaRPr lang="en-US"/>
           </a:p>
@@ -965,7 +966,7 @@
           <a:p>
             <a:fld id="{C56969A0-B3EA-45A4-A390-44554200A62E}" type="slidenum">
               <a:rPr lang="en-US" smtClean="0"/>
-              <a:t>68</a:t>
+              <a:t>69</a:t>
             </a:fld>
             <a:endParaRPr lang="en-US"/>
           </a:p>
@@ -1061,7 +1062,7 @@
           <a:p>
             <a:fld id="{C56969A0-B3EA-45A4-A390-44554200A62E}" type="slidenum">
               <a:rPr lang="en-US" smtClean="0"/>
-              <a:t>72</a:t>
+              <a:t>73</a:t>
             </a:fld>
             <a:endParaRPr lang="en-US"/>
           </a:p>
@@ -1145,7 +1146,7 @@
           <a:p>
             <a:fld id="{C56969A0-B3EA-45A4-A390-44554200A62E}" type="slidenum">
               <a:rPr lang="en-US" smtClean="0"/>
-              <a:t>74</a:t>
+              <a:t>75</a:t>
             </a:fld>
             <a:endParaRPr lang="en-US"/>
           </a:p>
@@ -1820,7 +1821,7 @@
           <a:p>
             <a:fld id="{C56969A0-B3EA-45A4-A390-44554200A62E}" type="slidenum">
               <a:rPr lang="en-US" smtClean="0"/>
-              <a:t>60</a:t>
+              <a:t>61</a:t>
             </a:fld>
             <a:endParaRPr lang="en-US"/>
           </a:p>
@@ -1968,7 +1969,7 @@
           <a:p>
             <a:fld id="{A70EB186-EB06-4AD4-B0FF-B396B68ED702}" type="datetimeFigureOut">
               <a:rPr lang="en-US" smtClean="0"/>
-              <a:t>11/19/2019</a:t>
+              <a:t>12/2/2019</a:t>
             </a:fld>
             <a:endParaRPr lang="en-US"/>
           </a:p>
@@ -2136,7 +2137,7 @@
           <a:p>
             <a:fld id="{A70EB186-EB06-4AD4-B0FF-B396B68ED702}" type="datetimeFigureOut">
               <a:rPr lang="en-US" smtClean="0"/>
-              <a:t>11/19/2019</a:t>
+              <a:t>12/2/2019</a:t>
             </a:fld>
             <a:endParaRPr lang="en-US"/>
           </a:p>
@@ -2314,7 +2315,7 @@
           <a:p>
             <a:fld id="{A70EB186-EB06-4AD4-B0FF-B396B68ED702}" type="datetimeFigureOut">
               <a:rPr lang="en-US" smtClean="0"/>
-              <a:t>11/19/2019</a:t>
+              <a:t>12/2/2019</a:t>
             </a:fld>
             <a:endParaRPr lang="en-US"/>
           </a:p>
@@ -2482,7 +2483,7 @@
           <a:p>
             <a:fld id="{A70EB186-EB06-4AD4-B0FF-B396B68ED702}" type="datetimeFigureOut">
               <a:rPr lang="en-US" smtClean="0"/>
-              <a:t>11/19/2019</a:t>
+              <a:t>12/2/2019</a:t>
             </a:fld>
             <a:endParaRPr lang="en-US"/>
           </a:p>
@@ -2727,7 +2728,7 @@
           <a:p>
             <a:fld id="{A70EB186-EB06-4AD4-B0FF-B396B68ED702}" type="datetimeFigureOut">
               <a:rPr lang="en-US" smtClean="0"/>
-              <a:t>11/19/2019</a:t>
+              <a:t>12/2/2019</a:t>
             </a:fld>
             <a:endParaRPr lang="en-US"/>
           </a:p>
@@ -2956,7 +2957,7 @@
           <a:p>
             <a:fld id="{A70EB186-EB06-4AD4-B0FF-B396B68ED702}" type="datetimeFigureOut">
               <a:rPr lang="en-US" smtClean="0"/>
-              <a:t>11/19/2019</a:t>
+              <a:t>12/2/2019</a:t>
             </a:fld>
             <a:endParaRPr lang="en-US"/>
           </a:p>
@@ -3320,7 +3321,7 @@
           <a:p>
             <a:fld id="{A70EB186-EB06-4AD4-B0FF-B396B68ED702}" type="datetimeFigureOut">
               <a:rPr lang="en-US" smtClean="0"/>
-              <a:t>11/19/2019</a:t>
+              <a:t>12/2/2019</a:t>
             </a:fld>
             <a:endParaRPr lang="en-US"/>
           </a:p>
@@ -3437,7 +3438,7 @@
           <a:p>
             <a:fld id="{A70EB186-EB06-4AD4-B0FF-B396B68ED702}" type="datetimeFigureOut">
               <a:rPr lang="en-US" smtClean="0"/>
-              <a:t>11/19/2019</a:t>
+              <a:t>12/2/2019</a:t>
             </a:fld>
             <a:endParaRPr lang="en-US"/>
           </a:p>
@@ -3532,7 +3533,7 @@
           <a:p>
             <a:fld id="{A70EB186-EB06-4AD4-B0FF-B396B68ED702}" type="datetimeFigureOut">
               <a:rPr lang="en-US" smtClean="0"/>
-              <a:t>11/19/2019</a:t>
+              <a:t>12/2/2019</a:t>
             </a:fld>
             <a:endParaRPr lang="en-US"/>
           </a:p>
@@ -3807,7 +3808,7 @@
           <a:p>
             <a:fld id="{A70EB186-EB06-4AD4-B0FF-B396B68ED702}" type="datetimeFigureOut">
               <a:rPr lang="en-US" smtClean="0"/>
-              <a:t>11/19/2019</a:t>
+              <a:t>12/2/2019</a:t>
             </a:fld>
             <a:endParaRPr lang="en-US"/>
           </a:p>
@@ -4059,7 +4060,7 @@
           <a:p>
             <a:fld id="{A70EB186-EB06-4AD4-B0FF-B396B68ED702}" type="datetimeFigureOut">
               <a:rPr lang="en-US" smtClean="0"/>
-              <a:t>11/19/2019</a:t>
+              <a:t>12/2/2019</a:t>
             </a:fld>
             <a:endParaRPr lang="en-US"/>
           </a:p>
@@ -4270,7 +4271,7 @@
           <a:p>
             <a:fld id="{A70EB186-EB06-4AD4-B0FF-B396B68ED702}" type="datetimeFigureOut">
               <a:rPr lang="en-US" smtClean="0"/>
-              <a:t>11/19/2019</a:t>
+              <a:t>12/2/2019</a:t>
             </a:fld>
             <a:endParaRPr lang="en-US"/>
           </a:p>
@@ -11082,7 +11083,7 @@
               </a:ln>
               <a:extLst>
                 <a:ext uri="{909E8E84-426E-40dd-AFC4-6F175D3DCCD1}">
-                  <a14:hiddenFill xmlns="" xmlns:a14="http://schemas.microsoft.com/office/drawing/2010/main">
+                  <a14:hiddenFill xmlns:a14="http://schemas.microsoft.com/office/drawing/2010/main" xmlns="">
                     <a:noFill/>
                   </a14:hiddenFill>
                 </a:ext>
@@ -11123,7 +11124,7 @@
               </a:ln>
               <a:extLst>
                 <a:ext uri="{909E8E84-426E-40dd-AFC4-6F175D3DCCD1}">
-                  <a14:hiddenFill xmlns="" xmlns:a14="http://schemas.microsoft.com/office/drawing/2010/main">
+                  <a14:hiddenFill xmlns:a14="http://schemas.microsoft.com/office/drawing/2010/main" xmlns="">
                     <a:solidFill>
                       <a:srgbClr val="FFFFFF"/>
                     </a:solidFill>
@@ -11288,7 +11289,7 @@
               </a:ln>
               <a:extLst>
                 <a:ext uri="{909E8E84-426E-40dd-AFC4-6F175D3DCCD1}">
-                  <a14:hiddenFill xmlns="" xmlns:a14="http://schemas.microsoft.com/office/drawing/2010/main">
+                  <a14:hiddenFill xmlns:a14="http://schemas.microsoft.com/office/drawing/2010/main" xmlns="">
                     <a:noFill/>
                   </a14:hiddenFill>
                 </a:ext>
@@ -11329,7 +11330,7 @@
               </a:ln>
               <a:extLst>
                 <a:ext uri="{909E8E84-426E-40dd-AFC4-6F175D3DCCD1}">
-                  <a14:hiddenFill xmlns="" xmlns:a14="http://schemas.microsoft.com/office/drawing/2010/main">
+                  <a14:hiddenFill xmlns:a14="http://schemas.microsoft.com/office/drawing/2010/main" xmlns="">
                     <a:solidFill>
                       <a:srgbClr val="FFFFFF"/>
                     </a:solidFill>
@@ -11494,7 +11495,7 @@
               </a:ln>
               <a:extLst>
                 <a:ext uri="{909E8E84-426E-40dd-AFC4-6F175D3DCCD1}">
-                  <a14:hiddenFill xmlns="" xmlns:a14="http://schemas.microsoft.com/office/drawing/2010/main">
+                  <a14:hiddenFill xmlns:a14="http://schemas.microsoft.com/office/drawing/2010/main" xmlns="">
                     <a:noFill/>
                   </a14:hiddenFill>
                 </a:ext>
@@ -11535,7 +11536,7 @@
               </a:ln>
               <a:extLst>
                 <a:ext uri="{909E8E84-426E-40dd-AFC4-6F175D3DCCD1}">
-                  <a14:hiddenFill xmlns="" xmlns:a14="http://schemas.microsoft.com/office/drawing/2010/main">
+                  <a14:hiddenFill xmlns:a14="http://schemas.microsoft.com/office/drawing/2010/main" xmlns="">
                     <a:solidFill>
                       <a:srgbClr val="FFFFFF"/>
                     </a:solidFill>
@@ -40885,7 +40886,7 @@
           <a:p>
             <a:r>
               <a:rPr lang="en-US" dirty="0"/>
-              <a:t>Passing double arrays as parameters:</a:t>
+              <a:t>Initializing double arrays:</a:t>
             </a:r>
           </a:p>
         </p:txBody>
@@ -40915,7 +40916,21 @@
                 <a:latin typeface="Courier New" panose="02070309020205020404" pitchFamily="49" charset="0"/>
                 <a:cs typeface="Courier New" panose="02070309020205020404" pitchFamily="49" charset="0"/>
               </a:rPr>
-              <a:t>public static void print(double[][] grid) {</a:t>
+              <a:t>// </a:t>
+            </a:r>
+            <a:r>
+              <a:rPr lang="en-US" sz="2400">
+                <a:latin typeface="Courier New" panose="02070309020205020404" pitchFamily="49" charset="0"/>
+                <a:cs typeface="Courier New" panose="02070309020205020404" pitchFamily="49" charset="0"/>
+              </a:rPr>
+              <a:t>Simple 4x4 </a:t>
+            </a:r>
+            <a:r>
+              <a:rPr lang="en-US" sz="2400" dirty="0">
+                <a:latin typeface="Courier New" panose="02070309020205020404" pitchFamily="49" charset="0"/>
+                <a:cs typeface="Courier New" panose="02070309020205020404" pitchFamily="49" charset="0"/>
+              </a:rPr>
+              <a:t>multiplication table</a:t>
             </a:r>
           </a:p>
           <a:p>
@@ -40927,77 +40942,21 @@
                 <a:latin typeface="Courier New" panose="02070309020205020404" pitchFamily="49" charset="0"/>
                 <a:cs typeface="Courier New" panose="02070309020205020404" pitchFamily="49" charset="0"/>
               </a:rPr>
-              <a:t>	for(</a:t>
+              <a:t>int[][] </a:t>
             </a:r>
             <a:r>
               <a:rPr lang="en-US" sz="2400" dirty="0" err="1">
                 <a:latin typeface="Courier New" panose="02070309020205020404" pitchFamily="49" charset="0"/>
                 <a:cs typeface="Courier New" panose="02070309020205020404" pitchFamily="49" charset="0"/>
               </a:rPr>
-              <a:t>int</a:t>
+              <a:t>multiplicationTable</a:t>
             </a:r>
             <a:r>
               <a:rPr lang="en-US" sz="2400" dirty="0">
                 <a:latin typeface="Courier New" panose="02070309020205020404" pitchFamily="49" charset="0"/>
                 <a:cs typeface="Courier New" panose="02070309020205020404" pitchFamily="49" charset="0"/>
               </a:rPr>
-              <a:t> </a:t>
-            </a:r>
-            <a:r>
-              <a:rPr lang="en-US" sz="2400" dirty="0" err="1">
-                <a:latin typeface="Courier New" panose="02070309020205020404" pitchFamily="49" charset="0"/>
-                <a:cs typeface="Courier New" panose="02070309020205020404" pitchFamily="49" charset="0"/>
-              </a:rPr>
-              <a:t>i</a:t>
-            </a:r>
-            <a:r>
-              <a:rPr lang="en-US" sz="2400" dirty="0">
-                <a:latin typeface="Courier New" panose="02070309020205020404" pitchFamily="49" charset="0"/>
-                <a:cs typeface="Courier New" panose="02070309020205020404" pitchFamily="49" charset="0"/>
-              </a:rPr>
-              <a:t> = 0; </a:t>
-            </a:r>
-            <a:r>
-              <a:rPr lang="en-US" sz="2400" dirty="0" err="1">
-                <a:latin typeface="Courier New" panose="02070309020205020404" pitchFamily="49" charset="0"/>
-                <a:cs typeface="Courier New" panose="02070309020205020404" pitchFamily="49" charset="0"/>
-              </a:rPr>
-              <a:t>i</a:t>
-            </a:r>
-            <a:r>
-              <a:rPr lang="en-US" sz="2400" dirty="0">
-                <a:latin typeface="Courier New" panose="02070309020205020404" pitchFamily="49" charset="0"/>
-                <a:cs typeface="Courier New" panose="02070309020205020404" pitchFamily="49" charset="0"/>
-              </a:rPr>
-              <a:t> &lt; </a:t>
-            </a:r>
-            <a:r>
-              <a:rPr lang="en-US" sz="2400" dirty="0" err="1">
-                <a:latin typeface="Courier New" panose="02070309020205020404" pitchFamily="49" charset="0"/>
-                <a:cs typeface="Courier New" panose="02070309020205020404" pitchFamily="49" charset="0"/>
-              </a:rPr>
-              <a:t>grid.length</a:t>
-            </a:r>
-            <a:r>
-              <a:rPr lang="en-US" sz="2400" dirty="0">
-                <a:latin typeface="Courier New" panose="02070309020205020404" pitchFamily="49" charset="0"/>
-                <a:cs typeface="Courier New" panose="02070309020205020404" pitchFamily="49" charset="0"/>
-              </a:rPr>
-              <a:t>; </a:t>
-            </a:r>
-            <a:r>
-              <a:rPr lang="en-US" sz="2400" dirty="0" err="1">
-                <a:latin typeface="Courier New" panose="02070309020205020404" pitchFamily="49" charset="0"/>
-                <a:cs typeface="Courier New" panose="02070309020205020404" pitchFamily="49" charset="0"/>
-              </a:rPr>
-              <a:t>i</a:t>
-            </a:r>
-            <a:r>
-              <a:rPr lang="en-US" sz="2400" dirty="0">
-                <a:latin typeface="Courier New" panose="02070309020205020404" pitchFamily="49" charset="0"/>
-                <a:cs typeface="Courier New" panose="02070309020205020404" pitchFamily="49" charset="0"/>
-              </a:rPr>
-              <a:t>++) {</a:t>
+              <a:t> = { </a:t>
             </a:r>
           </a:p>
           <a:p>
@@ -41009,49 +40968,7 @@
                 <a:latin typeface="Courier New" panose="02070309020205020404" pitchFamily="49" charset="0"/>
                 <a:cs typeface="Courier New" panose="02070309020205020404" pitchFamily="49" charset="0"/>
               </a:rPr>
-              <a:t>		for(</a:t>
-            </a:r>
-            <a:r>
-              <a:rPr lang="en-US" sz="2400" dirty="0" err="1">
-                <a:latin typeface="Courier New" panose="02070309020205020404" pitchFamily="49" charset="0"/>
-                <a:cs typeface="Courier New" panose="02070309020205020404" pitchFamily="49" charset="0"/>
-              </a:rPr>
-              <a:t>int</a:t>
-            </a:r>
-            <a:r>
-              <a:rPr lang="en-US" sz="2400" dirty="0">
-                <a:latin typeface="Courier New" panose="02070309020205020404" pitchFamily="49" charset="0"/>
-                <a:cs typeface="Courier New" panose="02070309020205020404" pitchFamily="49" charset="0"/>
-              </a:rPr>
-              <a:t> j = 0; j &lt; grid[</a:t>
-            </a:r>
-            <a:r>
-              <a:rPr lang="en-US" sz="2400" dirty="0" err="1">
-                <a:latin typeface="Courier New" panose="02070309020205020404" pitchFamily="49" charset="0"/>
-                <a:cs typeface="Courier New" panose="02070309020205020404" pitchFamily="49" charset="0"/>
-              </a:rPr>
-              <a:t>i</a:t>
-            </a:r>
-            <a:r>
-              <a:rPr lang="en-US" sz="2400" dirty="0">
-                <a:latin typeface="Courier New" panose="02070309020205020404" pitchFamily="49" charset="0"/>
-                <a:cs typeface="Courier New" panose="02070309020205020404" pitchFamily="49" charset="0"/>
-              </a:rPr>
-              <a:t>].length; </a:t>
-            </a:r>
-            <a:r>
-              <a:rPr lang="en-US" sz="2400" dirty="0" err="1">
-                <a:latin typeface="Courier New" panose="02070309020205020404" pitchFamily="49" charset="0"/>
-                <a:cs typeface="Courier New" panose="02070309020205020404" pitchFamily="49" charset="0"/>
-              </a:rPr>
-              <a:t>j++</a:t>
-            </a:r>
-            <a:r>
-              <a:rPr lang="en-US" sz="2400" dirty="0">
-                <a:latin typeface="Courier New" panose="02070309020205020404" pitchFamily="49" charset="0"/>
-                <a:cs typeface="Courier New" panose="02070309020205020404" pitchFamily="49" charset="0"/>
-              </a:rPr>
-              <a:t>) {</a:t>
+              <a:t>	{1,2,3,4}, </a:t>
             </a:r>
           </a:p>
           <a:p>
@@ -41063,35 +40980,7 @@
                 <a:latin typeface="Courier New" panose="02070309020205020404" pitchFamily="49" charset="0"/>
                 <a:cs typeface="Courier New" panose="02070309020205020404" pitchFamily="49" charset="0"/>
               </a:rPr>
-              <a:t>			</a:t>
-            </a:r>
-            <a:r>
-              <a:rPr lang="en-US" sz="2400" dirty="0" err="1">
-                <a:latin typeface="Courier New" panose="02070309020205020404" pitchFamily="49" charset="0"/>
-                <a:cs typeface="Courier New" panose="02070309020205020404" pitchFamily="49" charset="0"/>
-              </a:rPr>
-              <a:t>System.out.print</a:t>
-            </a:r>
-            <a:r>
-              <a:rPr lang="en-US" sz="2400" dirty="0">
-                <a:latin typeface="Courier New" panose="02070309020205020404" pitchFamily="49" charset="0"/>
-                <a:cs typeface="Courier New" panose="02070309020205020404" pitchFamily="49" charset="0"/>
-              </a:rPr>
-              <a:t>(grid[</a:t>
-            </a:r>
-            <a:r>
-              <a:rPr lang="en-US" sz="2400" dirty="0" err="1">
-                <a:latin typeface="Courier New" panose="02070309020205020404" pitchFamily="49" charset="0"/>
-                <a:cs typeface="Courier New" panose="02070309020205020404" pitchFamily="49" charset="0"/>
-              </a:rPr>
-              <a:t>i</a:t>
-            </a:r>
-            <a:r>
-              <a:rPr lang="en-US" sz="2400" dirty="0">
-                <a:latin typeface="Courier New" panose="02070309020205020404" pitchFamily="49" charset="0"/>
-                <a:cs typeface="Courier New" panose="02070309020205020404" pitchFamily="49" charset="0"/>
-              </a:rPr>
-              <a:t>][j] + “ “);</a:t>
+              <a:t>	{2,4,6,8},</a:t>
             </a:r>
           </a:p>
           <a:p>
@@ -41103,7 +40992,7 @@
                 <a:latin typeface="Courier New" panose="02070309020205020404" pitchFamily="49" charset="0"/>
                 <a:cs typeface="Courier New" panose="02070309020205020404" pitchFamily="49" charset="0"/>
               </a:rPr>
-              <a:t>		}</a:t>
+              <a:t>	{3,6,9,12},</a:t>
             </a:r>
           </a:p>
           <a:p>
@@ -41115,21 +41004,7 @@
                 <a:latin typeface="Courier New" panose="02070309020205020404" pitchFamily="49" charset="0"/>
                 <a:cs typeface="Courier New" panose="02070309020205020404" pitchFamily="49" charset="0"/>
               </a:rPr>
-              <a:t>		</a:t>
-            </a:r>
-            <a:r>
-              <a:rPr lang="en-US" sz="2400" dirty="0" err="1">
-                <a:latin typeface="Courier New" panose="02070309020205020404" pitchFamily="49" charset="0"/>
-                <a:cs typeface="Courier New" panose="02070309020205020404" pitchFamily="49" charset="0"/>
-              </a:rPr>
-              <a:t>System.out.println</a:t>
-            </a:r>
-            <a:r>
-              <a:rPr lang="en-US" sz="2400" dirty="0">
-                <a:latin typeface="Courier New" panose="02070309020205020404" pitchFamily="49" charset="0"/>
-                <a:cs typeface="Courier New" panose="02070309020205020404" pitchFamily="49" charset="0"/>
-              </a:rPr>
-              <a:t>();</a:t>
+              <a:t>	{4,8,12,16}</a:t>
             </a:r>
           </a:p>
           <a:p>
@@ -41141,19 +41016,7 @@
                 <a:latin typeface="Courier New" panose="02070309020205020404" pitchFamily="49" charset="0"/>
                 <a:cs typeface="Courier New" panose="02070309020205020404" pitchFamily="49" charset="0"/>
               </a:rPr>
-              <a:t>	}</a:t>
-            </a:r>
-          </a:p>
-          <a:p>
-            <a:pPr marL="0" indent="0">
-              <a:buNone/>
-            </a:pPr>
-            <a:r>
-              <a:rPr lang="en-US" sz="2400" dirty="0">
-                <a:latin typeface="Courier New" panose="02070309020205020404" pitchFamily="49" charset="0"/>
-                <a:cs typeface="Courier New" panose="02070309020205020404" pitchFamily="49" charset="0"/>
-              </a:rPr>
-              <a:t>}</a:t>
+              <a:t>};</a:t>
             </a:r>
           </a:p>
         </p:txBody>
@@ -41200,14 +41063,12 @@
         </p:nvSpPr>
         <p:spPr/>
         <p:txBody>
-          <a:bodyPr>
-            <a:normAutofit/>
-          </a:bodyPr>
+          <a:bodyPr/>
           <a:lstStyle/>
           <a:p>
             <a:r>
               <a:rPr lang="en-US" dirty="0"/>
-              <a:t>Homework</a:t>
+              <a:t>Passing double arrays as parameters:</a:t>
             </a:r>
           </a:p>
         </p:txBody>
@@ -41224,38 +41085,258 @@
         </p:nvSpPr>
         <p:spPr/>
         <p:txBody>
-          <a:bodyPr/>
+          <a:bodyPr>
+            <a:normAutofit/>
+          </a:bodyPr>
           <a:lstStyle/>
           <a:p>
             <a:pPr marL="0" indent="0">
               <a:buNone/>
             </a:pPr>
             <a:r>
-              <a:rPr lang="en-US" dirty="0"/>
-              <a:t>Read HW 10.1 up to “Adding to and Removing from an </a:t>
-            </a:r>
-            <a:r>
-              <a:rPr lang="en-US" dirty="0" err="1"/>
-              <a:t>ArrayList</a:t>
-            </a:r>
-            <a:r>
-              <a:rPr lang="en-US" dirty="0"/>
-              <a:t>.”</a:t>
+              <a:rPr lang="en-US" sz="2400" dirty="0">
+                <a:latin typeface="Courier New" panose="02070309020205020404" pitchFamily="49" charset="0"/>
+                <a:cs typeface="Courier New" panose="02070309020205020404" pitchFamily="49" charset="0"/>
+              </a:rPr>
+              <a:t>public static void print(double[][] grid) {</a:t>
             </a:r>
           </a:p>
           <a:p>
             <a:pPr marL="0" indent="0">
               <a:buNone/>
             </a:pPr>
-            <a:endParaRPr lang="en-US" dirty="0"/>
+            <a:r>
+              <a:rPr lang="en-US" sz="2400" dirty="0">
+                <a:latin typeface="Courier New" panose="02070309020205020404" pitchFamily="49" charset="0"/>
+                <a:cs typeface="Courier New" panose="02070309020205020404" pitchFamily="49" charset="0"/>
+              </a:rPr>
+              <a:t>	for(</a:t>
+            </a:r>
+            <a:r>
+              <a:rPr lang="en-US" sz="2400" dirty="0" err="1">
+                <a:latin typeface="Courier New" panose="02070309020205020404" pitchFamily="49" charset="0"/>
+                <a:cs typeface="Courier New" panose="02070309020205020404" pitchFamily="49" charset="0"/>
+              </a:rPr>
+              <a:t>int</a:t>
+            </a:r>
+            <a:r>
+              <a:rPr lang="en-US" sz="2400" dirty="0">
+                <a:latin typeface="Courier New" panose="02070309020205020404" pitchFamily="49" charset="0"/>
+                <a:cs typeface="Courier New" panose="02070309020205020404" pitchFamily="49" charset="0"/>
+              </a:rPr>
+              <a:t> </a:t>
+            </a:r>
+            <a:r>
+              <a:rPr lang="en-US" sz="2400" dirty="0" err="1">
+                <a:latin typeface="Courier New" panose="02070309020205020404" pitchFamily="49" charset="0"/>
+                <a:cs typeface="Courier New" panose="02070309020205020404" pitchFamily="49" charset="0"/>
+              </a:rPr>
+              <a:t>i</a:t>
+            </a:r>
+            <a:r>
+              <a:rPr lang="en-US" sz="2400" dirty="0">
+                <a:latin typeface="Courier New" panose="02070309020205020404" pitchFamily="49" charset="0"/>
+                <a:cs typeface="Courier New" panose="02070309020205020404" pitchFamily="49" charset="0"/>
+              </a:rPr>
+              <a:t> = 0; </a:t>
+            </a:r>
+            <a:r>
+              <a:rPr lang="en-US" sz="2400" dirty="0" err="1">
+                <a:latin typeface="Courier New" panose="02070309020205020404" pitchFamily="49" charset="0"/>
+                <a:cs typeface="Courier New" panose="02070309020205020404" pitchFamily="49" charset="0"/>
+              </a:rPr>
+              <a:t>i</a:t>
+            </a:r>
+            <a:r>
+              <a:rPr lang="en-US" sz="2400" dirty="0">
+                <a:latin typeface="Courier New" panose="02070309020205020404" pitchFamily="49" charset="0"/>
+                <a:cs typeface="Courier New" panose="02070309020205020404" pitchFamily="49" charset="0"/>
+              </a:rPr>
+              <a:t> &lt; </a:t>
+            </a:r>
+            <a:r>
+              <a:rPr lang="en-US" sz="2400" dirty="0" err="1">
+                <a:latin typeface="Courier New" panose="02070309020205020404" pitchFamily="49" charset="0"/>
+                <a:cs typeface="Courier New" panose="02070309020205020404" pitchFamily="49" charset="0"/>
+              </a:rPr>
+              <a:t>grid.length</a:t>
+            </a:r>
+            <a:r>
+              <a:rPr lang="en-US" sz="2400" dirty="0">
+                <a:latin typeface="Courier New" panose="02070309020205020404" pitchFamily="49" charset="0"/>
+                <a:cs typeface="Courier New" panose="02070309020205020404" pitchFamily="49" charset="0"/>
+              </a:rPr>
+              <a:t>; </a:t>
+            </a:r>
+            <a:r>
+              <a:rPr lang="en-US" sz="2400" dirty="0" err="1">
+                <a:latin typeface="Courier New" panose="02070309020205020404" pitchFamily="49" charset="0"/>
+                <a:cs typeface="Courier New" panose="02070309020205020404" pitchFamily="49" charset="0"/>
+              </a:rPr>
+              <a:t>i</a:t>
+            </a:r>
+            <a:r>
+              <a:rPr lang="en-US" sz="2400" dirty="0">
+                <a:latin typeface="Courier New" panose="02070309020205020404" pitchFamily="49" charset="0"/>
+                <a:cs typeface="Courier New" panose="02070309020205020404" pitchFamily="49" charset="0"/>
+              </a:rPr>
+              <a:t>++) {</a:t>
+            </a:r>
           </a:p>
           <a:p>
             <a:pPr marL="0" indent="0">
               <a:buNone/>
             </a:pPr>
             <a:r>
-              <a:rPr lang="en-US" dirty="0"/>
-              <a:t>Complete chapter 10 self-check problems #1 – 6. </a:t>
+              <a:rPr lang="en-US" sz="2400" dirty="0">
+                <a:latin typeface="Courier New" panose="02070309020205020404" pitchFamily="49" charset="0"/>
+                <a:cs typeface="Courier New" panose="02070309020205020404" pitchFamily="49" charset="0"/>
+              </a:rPr>
+              <a:t>		for(</a:t>
+            </a:r>
+            <a:r>
+              <a:rPr lang="en-US" sz="2400" dirty="0" err="1">
+                <a:latin typeface="Courier New" panose="02070309020205020404" pitchFamily="49" charset="0"/>
+                <a:cs typeface="Courier New" panose="02070309020205020404" pitchFamily="49" charset="0"/>
+              </a:rPr>
+              <a:t>int</a:t>
+            </a:r>
+            <a:r>
+              <a:rPr lang="en-US" sz="2400" dirty="0">
+                <a:latin typeface="Courier New" panose="02070309020205020404" pitchFamily="49" charset="0"/>
+                <a:cs typeface="Courier New" panose="02070309020205020404" pitchFamily="49" charset="0"/>
+              </a:rPr>
+              <a:t> j = 0; j &lt; grid[</a:t>
+            </a:r>
+            <a:r>
+              <a:rPr lang="en-US" sz="2400" dirty="0" err="1">
+                <a:latin typeface="Courier New" panose="02070309020205020404" pitchFamily="49" charset="0"/>
+                <a:cs typeface="Courier New" panose="02070309020205020404" pitchFamily="49" charset="0"/>
+              </a:rPr>
+              <a:t>i</a:t>
+            </a:r>
+            <a:r>
+              <a:rPr lang="en-US" sz="2400" dirty="0">
+                <a:latin typeface="Courier New" panose="02070309020205020404" pitchFamily="49" charset="0"/>
+                <a:cs typeface="Courier New" panose="02070309020205020404" pitchFamily="49" charset="0"/>
+              </a:rPr>
+              <a:t>].length; </a:t>
+            </a:r>
+            <a:r>
+              <a:rPr lang="en-US" sz="2400" dirty="0" err="1">
+                <a:latin typeface="Courier New" panose="02070309020205020404" pitchFamily="49" charset="0"/>
+                <a:cs typeface="Courier New" panose="02070309020205020404" pitchFamily="49" charset="0"/>
+              </a:rPr>
+              <a:t>j++</a:t>
+            </a:r>
+            <a:r>
+              <a:rPr lang="en-US" sz="2400" dirty="0">
+                <a:latin typeface="Courier New" panose="02070309020205020404" pitchFamily="49" charset="0"/>
+                <a:cs typeface="Courier New" panose="02070309020205020404" pitchFamily="49" charset="0"/>
+              </a:rPr>
+              <a:t>) {</a:t>
+            </a:r>
+          </a:p>
+          <a:p>
+            <a:pPr marL="0" indent="0">
+              <a:buNone/>
+            </a:pPr>
+            <a:r>
+              <a:rPr lang="en-US" sz="2400" dirty="0">
+                <a:latin typeface="Courier New" panose="02070309020205020404" pitchFamily="49" charset="0"/>
+                <a:cs typeface="Courier New" panose="02070309020205020404" pitchFamily="49" charset="0"/>
+              </a:rPr>
+              <a:t>			</a:t>
+            </a:r>
+            <a:r>
+              <a:rPr lang="en-US" sz="2400" dirty="0" err="1">
+                <a:latin typeface="Courier New" panose="02070309020205020404" pitchFamily="49" charset="0"/>
+                <a:cs typeface="Courier New" panose="02070309020205020404" pitchFamily="49" charset="0"/>
+              </a:rPr>
+              <a:t>System.out.print</a:t>
+            </a:r>
+            <a:r>
+              <a:rPr lang="en-US" sz="2400" dirty="0">
+                <a:latin typeface="Courier New" panose="02070309020205020404" pitchFamily="49" charset="0"/>
+                <a:cs typeface="Courier New" panose="02070309020205020404" pitchFamily="49" charset="0"/>
+              </a:rPr>
+              <a:t>(grid[</a:t>
+            </a:r>
+            <a:r>
+              <a:rPr lang="en-US" sz="2400" dirty="0" err="1">
+                <a:latin typeface="Courier New" panose="02070309020205020404" pitchFamily="49" charset="0"/>
+                <a:cs typeface="Courier New" panose="02070309020205020404" pitchFamily="49" charset="0"/>
+              </a:rPr>
+              <a:t>i</a:t>
+            </a:r>
+            <a:r>
+              <a:rPr lang="en-US" sz="2400" dirty="0">
+                <a:latin typeface="Courier New" panose="02070309020205020404" pitchFamily="49" charset="0"/>
+                <a:cs typeface="Courier New" panose="02070309020205020404" pitchFamily="49" charset="0"/>
+              </a:rPr>
+              <a:t>][j] + “ “);</a:t>
+            </a:r>
+          </a:p>
+          <a:p>
+            <a:pPr marL="0" indent="0">
+              <a:buNone/>
+            </a:pPr>
+            <a:r>
+              <a:rPr lang="en-US" sz="2400" dirty="0">
+                <a:latin typeface="Courier New" panose="02070309020205020404" pitchFamily="49" charset="0"/>
+                <a:cs typeface="Courier New" panose="02070309020205020404" pitchFamily="49" charset="0"/>
+              </a:rPr>
+              <a:t>		}</a:t>
+            </a:r>
+          </a:p>
+          <a:p>
+            <a:pPr marL="0" indent="0">
+              <a:buNone/>
+            </a:pPr>
+            <a:r>
+              <a:rPr lang="en-US" sz="2400" dirty="0">
+                <a:latin typeface="Courier New" panose="02070309020205020404" pitchFamily="49" charset="0"/>
+                <a:cs typeface="Courier New" panose="02070309020205020404" pitchFamily="49" charset="0"/>
+              </a:rPr>
+              <a:t>		</a:t>
+            </a:r>
+            <a:r>
+              <a:rPr lang="en-US" sz="2400" dirty="0" err="1">
+                <a:latin typeface="Courier New" panose="02070309020205020404" pitchFamily="49" charset="0"/>
+                <a:cs typeface="Courier New" panose="02070309020205020404" pitchFamily="49" charset="0"/>
+              </a:rPr>
+              <a:t>System.out.println</a:t>
+            </a:r>
+            <a:r>
+              <a:rPr lang="en-US" sz="2400" dirty="0">
+                <a:latin typeface="Courier New" panose="02070309020205020404" pitchFamily="49" charset="0"/>
+                <a:cs typeface="Courier New" panose="02070309020205020404" pitchFamily="49" charset="0"/>
+              </a:rPr>
+              <a:t>();</a:t>
+            </a:r>
+          </a:p>
+          <a:p>
+            <a:pPr marL="0" indent="0">
+              <a:buNone/>
+            </a:pPr>
+            <a:r>
+              <a:rPr lang="en-US" sz="2400" dirty="0">
+                <a:latin typeface="Courier New" panose="02070309020205020404" pitchFamily="49" charset="0"/>
+                <a:cs typeface="Courier New" panose="02070309020205020404" pitchFamily="49" charset="0"/>
+              </a:rPr>
+              <a:t>	}</a:t>
+            </a:r>
+          </a:p>
+          <a:p>
+            <a:pPr marL="0" indent="0">
+              <a:buNone/>
+            </a:pPr>
+            <a:r>
+              <a:rPr lang="en-US" sz="2400" dirty="0">
+                <a:latin typeface="Courier New" panose="02070309020205020404" pitchFamily="49" charset="0"/>
+                <a:cs typeface="Courier New" panose="02070309020205020404" pitchFamily="49" charset="0"/>
+              </a:rPr>
+              <a:t>}</a:t>
             </a:r>
           </a:p>
         </p:txBody>
@@ -41263,7 +41344,7 @@
     </p:spTree>
     <p:extLst>
       <p:ext uri="{BB962C8B-B14F-4D97-AF65-F5344CB8AC3E}">
-        <p14:creationId xmlns:p14="http://schemas.microsoft.com/office/powerpoint/2010/main" val="2752484407"/>
+        <p14:creationId xmlns:p14="http://schemas.microsoft.com/office/powerpoint/2010/main" val="3221619435"/>
       </p:ext>
     </p:extLst>
   </p:cSld>
@@ -41357,7 +41438,7 @@
             <a:spLocks noGrp="1"/>
           </p:cNvSpPr>
           <p:nvPr>
-            <p:ph type="ctrTitle"/>
+            <p:ph type="title"/>
           </p:nvPr>
         </p:nvSpPr>
         <p:spPr/>
@@ -41368,21 +41449,20 @@
           <a:lstStyle/>
           <a:p>
             <a:r>
-              <a:rPr lang="en-US" dirty="0" err="1"/>
-              <a:t>ArrayList</a:t>
-            </a:r>
-            <a:endParaRPr lang="en-US" dirty="0"/>
+              <a:rPr lang="en-US" dirty="0"/>
+              <a:t>Homework</a:t>
+            </a:r>
           </a:p>
         </p:txBody>
       </p:sp>
       <p:sp>
         <p:nvSpPr>
-          <p:cNvPr id="3" name="Subtitle 2"/>
+          <p:cNvPr id="3" name="Content Placeholder 2"/>
           <p:cNvSpPr>
             <a:spLocks noGrp="1"/>
           </p:cNvSpPr>
           <p:nvPr>
-            <p:ph type="subTitle" idx="1"/>
+            <p:ph idx="1"/>
           </p:nvPr>
         </p:nvSpPr>
         <p:spPr/>
@@ -41390,9 +41470,35 @@
           <a:bodyPr/>
           <a:lstStyle/>
           <a:p>
+            <a:pPr marL="0" indent="0">
+              <a:buNone/>
+            </a:pPr>
             <a:r>
               <a:rPr lang="en-US" dirty="0"/>
-              <a:t>[ 4.07 ] [ Today’s Date ] [ Instructor Name ]</a:t>
+              <a:t>Read HW 10.1 up to “Adding to and Removing from an </a:t>
+            </a:r>
+            <a:r>
+              <a:rPr lang="en-US" dirty="0" err="1"/>
+              <a:t>ArrayList</a:t>
+            </a:r>
+            <a:r>
+              <a:rPr lang="en-US" dirty="0"/>
+              <a:t>.”</a:t>
+            </a:r>
+          </a:p>
+          <a:p>
+            <a:pPr marL="0" indent="0">
+              <a:buNone/>
+            </a:pPr>
+            <a:endParaRPr lang="en-US" dirty="0"/>
+          </a:p>
+          <a:p>
+            <a:pPr marL="0" indent="0">
+              <a:buNone/>
+            </a:pPr>
+            <a:r>
+              <a:rPr lang="en-US" dirty="0"/>
+              <a:t>Complete chapter 10 self-check problems #1 – 6. </a:t>
             </a:r>
           </a:p>
         </p:txBody>
@@ -41400,7 +41506,7 @@
     </p:spTree>
     <p:extLst>
       <p:ext uri="{BB962C8B-B14F-4D97-AF65-F5344CB8AC3E}">
-        <p14:creationId xmlns:p14="http://schemas.microsoft.com/office/powerpoint/2010/main" val="2313324268"/>
+        <p14:creationId xmlns:p14="http://schemas.microsoft.com/office/powerpoint/2010/main" val="2752484407"/>
       </p:ext>
     </p:extLst>
   </p:cSld>
@@ -41434,34 +41540,7 @@
             <a:spLocks noGrp="1"/>
           </p:cNvSpPr>
           <p:nvPr>
-            <p:ph type="title"/>
-          </p:nvPr>
-        </p:nvSpPr>
-        <p:spPr/>
-        <p:txBody>
-          <a:bodyPr/>
-          <a:lstStyle/>
-          <a:p>
-            <a:r>
-              <a:rPr lang="en-US" dirty="0"/>
-              <a:t>The </a:t>
-            </a:r>
-            <a:r>
-              <a:rPr lang="en-US" dirty="0" err="1"/>
-              <a:t>ArrayList</a:t>
-            </a:r>
-            <a:endParaRPr lang="en-US" dirty="0"/>
-          </a:p>
-        </p:txBody>
-      </p:sp>
-      <p:sp>
-        <p:nvSpPr>
-          <p:cNvPr id="3" name="Content Placeholder 2"/>
-          <p:cNvSpPr>
-            <a:spLocks noGrp="1"/>
-          </p:cNvSpPr>
-          <p:nvPr>
-            <p:ph idx="1"/>
+            <p:ph type="ctrTitle"/>
           </p:nvPr>
         </p:nvSpPr>
         <p:spPr/>
@@ -41471,124 +41550,40 @@
           </a:bodyPr>
           <a:lstStyle/>
           <a:p>
-            <a:pPr marL="0" indent="0">
-              <a:buNone/>
-            </a:pPr>
-            <a:endParaRPr lang="en-US" sz="2400" dirty="0"/>
-          </a:p>
-          <a:p>
-            <a:pPr marL="0" indent="0">
-              <a:buNone/>
-            </a:pPr>
-            <a:r>
-              <a:rPr lang="en-US" sz="2400" dirty="0" err="1">
-                <a:latin typeface="Courier New" panose="02070309020205020404" pitchFamily="49" charset="0"/>
-                <a:cs typeface="Courier New" panose="02070309020205020404" pitchFamily="49" charset="0"/>
-              </a:rPr>
+            <a:r>
+              <a:rPr lang="en-US" dirty="0" err="1"/>
               <a:t>ArrayList</a:t>
             </a:r>
-            <a:r>
-              <a:rPr lang="en-US" sz="2400" dirty="0">
-                <a:latin typeface="Courier New" panose="02070309020205020404" pitchFamily="49" charset="0"/>
-                <a:cs typeface="Courier New" panose="02070309020205020404" pitchFamily="49" charset="0"/>
-              </a:rPr>
-              <a:t>&lt;String&gt; , </a:t>
-            </a:r>
-            <a:r>
-              <a:rPr lang="en-US" sz="2400" dirty="0" err="1">
-                <a:latin typeface="Courier New" panose="02070309020205020404" pitchFamily="49" charset="0"/>
-                <a:cs typeface="Courier New" panose="02070309020205020404" pitchFamily="49" charset="0"/>
-              </a:rPr>
-              <a:t>ArrayList</a:t>
-            </a:r>
-            <a:r>
-              <a:rPr lang="en-US" sz="2400" dirty="0">
-                <a:latin typeface="Courier New" panose="02070309020205020404" pitchFamily="49" charset="0"/>
-                <a:cs typeface="Courier New" panose="02070309020205020404" pitchFamily="49" charset="0"/>
-              </a:rPr>
-              <a:t>&lt;Point&gt;</a:t>
-            </a:r>
-          </a:p>
-          <a:p>
-            <a:pPr marL="0" indent="0">
-              <a:buNone/>
-            </a:pPr>
-            <a:endParaRPr lang="en-US" sz="2400" dirty="0">
-              <a:latin typeface="Courier New" panose="02070309020205020404" pitchFamily="49" charset="0"/>
-              <a:cs typeface="Courier New" panose="02070309020205020404" pitchFamily="49" charset="0"/>
-            </a:endParaRPr>
-          </a:p>
-          <a:p>
-            <a:pPr marL="0" indent="0">
-              <a:buNone/>
-            </a:pPr>
-            <a:r>
-              <a:rPr lang="en-US" sz="2400" dirty="0" err="1">
-                <a:latin typeface="Courier New" panose="02070309020205020404" pitchFamily="49" charset="0"/>
-                <a:cs typeface="Courier New" panose="02070309020205020404" pitchFamily="49" charset="0"/>
-              </a:rPr>
-              <a:t>ArrayList</a:t>
-            </a:r>
-            <a:r>
-              <a:rPr lang="en-US" sz="2400" dirty="0">
-                <a:latin typeface="Courier New" panose="02070309020205020404" pitchFamily="49" charset="0"/>
-                <a:cs typeface="Courier New" panose="02070309020205020404" pitchFamily="49" charset="0"/>
-              </a:rPr>
-              <a:t>&lt;String&gt; </a:t>
-            </a:r>
-            <a:r>
-              <a:rPr lang="en-US" sz="2400" dirty="0" err="1">
-                <a:latin typeface="Courier New" panose="02070309020205020404" pitchFamily="49" charset="0"/>
-                <a:cs typeface="Courier New" panose="02070309020205020404" pitchFamily="49" charset="0"/>
-              </a:rPr>
-              <a:t>spongebob</a:t>
-            </a:r>
-            <a:r>
-              <a:rPr lang="en-US" sz="2400" dirty="0">
-                <a:latin typeface="Courier New" panose="02070309020205020404" pitchFamily="49" charset="0"/>
-                <a:cs typeface="Courier New" panose="02070309020205020404" pitchFamily="49" charset="0"/>
-              </a:rPr>
-              <a:t> = new </a:t>
-            </a:r>
-            <a:r>
-              <a:rPr lang="en-US" sz="2400" dirty="0" err="1">
-                <a:latin typeface="Courier New" panose="02070309020205020404" pitchFamily="49" charset="0"/>
-                <a:cs typeface="Courier New" panose="02070309020205020404" pitchFamily="49" charset="0"/>
-              </a:rPr>
-              <a:t>ArrayList</a:t>
-            </a:r>
-            <a:r>
-              <a:rPr lang="en-US" sz="2400" dirty="0">
-                <a:latin typeface="Courier New" panose="02070309020205020404" pitchFamily="49" charset="0"/>
-                <a:cs typeface="Courier New" panose="02070309020205020404" pitchFamily="49" charset="0"/>
-              </a:rPr>
-              <a:t>&lt;String&gt;();</a:t>
-            </a:r>
-          </a:p>
-          <a:p>
-            <a:pPr marL="0" indent="0">
-              <a:buNone/>
-            </a:pPr>
-            <a:endParaRPr lang="en-US" sz="2400" dirty="0">
-              <a:latin typeface="Courier New" panose="02070309020205020404" pitchFamily="49" charset="0"/>
-              <a:cs typeface="Courier New" panose="02070309020205020404" pitchFamily="49" charset="0"/>
-            </a:endParaRPr>
-          </a:p>
-          <a:p>
-            <a:pPr marL="0" indent="0">
-              <a:buNone/>
-            </a:pPr>
-            <a:endParaRPr lang="en-US" sz="2400" dirty="0">
-              <a:latin typeface="Courier New" panose="02070309020205020404" pitchFamily="49" charset="0"/>
-              <a:cs typeface="Courier New" panose="02070309020205020404" pitchFamily="49" charset="0"/>
-            </a:endParaRPr>
+            <a:endParaRPr lang="en-US" dirty="0"/>
+          </a:p>
+        </p:txBody>
+      </p:sp>
+      <p:sp>
+        <p:nvSpPr>
+          <p:cNvPr id="3" name="Subtitle 2"/>
+          <p:cNvSpPr>
+            <a:spLocks noGrp="1"/>
+          </p:cNvSpPr>
+          <p:nvPr>
+            <p:ph type="subTitle" idx="1"/>
+          </p:nvPr>
+        </p:nvSpPr>
+        <p:spPr/>
+        <p:txBody>
+          <a:bodyPr/>
+          <a:lstStyle/>
+          <a:p>
+            <a:r>
+              <a:rPr lang="en-US" dirty="0"/>
+              <a:t>[ 4.07 ] [ Today’s Date ] [ Instructor Name ]</a:t>
+            </a:r>
           </a:p>
         </p:txBody>
       </p:sp>
     </p:spTree>
     <p:extLst>
       <p:ext uri="{BB962C8B-B14F-4D97-AF65-F5344CB8AC3E}">
-        <p14:creationId xmlns:p14="http://schemas.microsoft.com/office/powerpoint/2010/main" val="4230593330"/>
+        <p14:creationId xmlns:p14="http://schemas.microsoft.com/office/powerpoint/2010/main" val="2313324268"/>
       </p:ext>
     </p:extLst>
   </p:cSld>
@@ -41662,20 +41657,7 @@
             <a:pPr marL="0" indent="0">
               <a:buNone/>
             </a:pPr>
-            <a:r>
-              <a:rPr lang="en-US" sz="2400" dirty="0" err="1">
-                <a:latin typeface="Courier New" panose="02070309020205020404" pitchFamily="49" charset="0"/>
-                <a:cs typeface="Courier New" panose="02070309020205020404" pitchFamily="49" charset="0"/>
-              </a:rPr>
-              <a:t>spongebob.add</a:t>
-            </a:r>
-            <a:r>
-              <a:rPr lang="en-US" sz="2400" dirty="0">
-                <a:latin typeface="Courier New" panose="02070309020205020404" pitchFamily="49" charset="0"/>
-                <a:cs typeface="Courier New" panose="02070309020205020404" pitchFamily="49" charset="0"/>
-              </a:rPr>
-              <a:t>(“Patrick Star”);</a:t>
-            </a:r>
+            <a:endParaRPr lang="en-US" sz="2400" dirty="0"/>
           </a:p>
           <a:p>
             <a:pPr marL="0" indent="0">
@@ -41686,99 +41668,28 @@
                 <a:latin typeface="Courier New" panose="02070309020205020404" pitchFamily="49" charset="0"/>
                 <a:cs typeface="Courier New" panose="02070309020205020404" pitchFamily="49" charset="0"/>
               </a:rPr>
-              <a:t>spongebob.add</a:t>
+              <a:t>ArrayList</a:t>
             </a:r>
             <a:r>
               <a:rPr lang="en-US" sz="2400" dirty="0">
                 <a:latin typeface="Courier New" panose="02070309020205020404" pitchFamily="49" charset="0"/>
                 <a:cs typeface="Courier New" panose="02070309020205020404" pitchFamily="49" charset="0"/>
               </a:rPr>
-              <a:t>(“</a:t>
+              <a:t>&lt;String&gt; , </a:t>
             </a:r>
             <a:r>
               <a:rPr lang="en-US" sz="2400" dirty="0" err="1">
                 <a:latin typeface="Courier New" panose="02070309020205020404" pitchFamily="49" charset="0"/>
                 <a:cs typeface="Courier New" panose="02070309020205020404" pitchFamily="49" charset="0"/>
               </a:rPr>
-              <a:t>Squidward</a:t>
+              <a:t>ArrayList</a:t>
             </a:r>
             <a:r>
               <a:rPr lang="en-US" sz="2400" dirty="0">
                 <a:latin typeface="Courier New" panose="02070309020205020404" pitchFamily="49" charset="0"/>
                 <a:cs typeface="Courier New" panose="02070309020205020404" pitchFamily="49" charset="0"/>
               </a:rPr>
-              <a:t> Tentacles”);</a:t>
-            </a:r>
-          </a:p>
-          <a:p>
-            <a:pPr marL="0" indent="0">
-              <a:buNone/>
-            </a:pPr>
-            <a:r>
-              <a:rPr lang="en-US" sz="2400" dirty="0" err="1">
-                <a:latin typeface="Courier New" panose="02070309020205020404" pitchFamily="49" charset="0"/>
-                <a:cs typeface="Courier New" panose="02070309020205020404" pitchFamily="49" charset="0"/>
-              </a:rPr>
-              <a:t>spongebob.add</a:t>
-            </a:r>
-            <a:r>
-              <a:rPr lang="en-US" sz="2400" dirty="0">
-                <a:latin typeface="Courier New" panose="02070309020205020404" pitchFamily="49" charset="0"/>
-                <a:cs typeface="Courier New" panose="02070309020205020404" pitchFamily="49" charset="0"/>
-              </a:rPr>
-              <a:t>(“Mr. </a:t>
-            </a:r>
-            <a:r>
-              <a:rPr lang="en-US" sz="2400" dirty="0" err="1">
-                <a:latin typeface="Courier New" panose="02070309020205020404" pitchFamily="49" charset="0"/>
-                <a:cs typeface="Courier New" panose="02070309020205020404" pitchFamily="49" charset="0"/>
-              </a:rPr>
-              <a:t>Krabs</a:t>
-            </a:r>
-            <a:r>
-              <a:rPr lang="en-US" sz="2400" dirty="0">
-                <a:latin typeface="Courier New" panose="02070309020205020404" pitchFamily="49" charset="0"/>
-                <a:cs typeface="Courier New" panose="02070309020205020404" pitchFamily="49" charset="0"/>
-              </a:rPr>
-              <a:t>”);</a:t>
-            </a:r>
-          </a:p>
-          <a:p>
-            <a:pPr marL="0" indent="0">
-              <a:buNone/>
-            </a:pPr>
-            <a:r>
-              <a:rPr lang="en-US" sz="2400" dirty="0" err="1">
-                <a:latin typeface="Courier New" panose="02070309020205020404" pitchFamily="49" charset="0"/>
-                <a:cs typeface="Courier New" panose="02070309020205020404" pitchFamily="49" charset="0"/>
-              </a:rPr>
-              <a:t>spongebob.add</a:t>
-            </a:r>
-            <a:r>
-              <a:rPr lang="en-US" sz="2400" dirty="0">
-                <a:latin typeface="Courier New" panose="02070309020205020404" pitchFamily="49" charset="0"/>
-                <a:cs typeface="Courier New" panose="02070309020205020404" pitchFamily="49" charset="0"/>
-              </a:rPr>
-              <a:t>(“Pikachu”);</a:t>
-            </a:r>
-          </a:p>
-          <a:p>
-            <a:pPr marL="0" indent="0">
-              <a:buNone/>
-            </a:pPr>
-            <a:r>
-              <a:rPr lang="en-US" sz="2400" dirty="0" err="1">
-                <a:latin typeface="Courier New" panose="02070309020205020404" pitchFamily="49" charset="0"/>
-                <a:cs typeface="Courier New" panose="02070309020205020404" pitchFamily="49" charset="0"/>
-              </a:rPr>
-              <a:t>spongebob.add</a:t>
-            </a:r>
-            <a:r>
-              <a:rPr lang="en-US" sz="2400" dirty="0">
-                <a:latin typeface="Courier New" panose="02070309020205020404" pitchFamily="49" charset="0"/>
-                <a:cs typeface="Courier New" panose="02070309020205020404" pitchFamily="49" charset="0"/>
-              </a:rPr>
-              <a:t>(“Sandy Cheeks”);</a:t>
+              <a:t>&lt;Point&gt;</a:t>
             </a:r>
           </a:p>
           <a:p>
@@ -41795,38 +41706,52 @@
               <a:buNone/>
             </a:pPr>
             <a:r>
+              <a:rPr lang="en-US" sz="2400" dirty="0" err="1">
+                <a:latin typeface="Courier New" panose="02070309020205020404" pitchFamily="49" charset="0"/>
+                <a:cs typeface="Courier New" panose="02070309020205020404" pitchFamily="49" charset="0"/>
+              </a:rPr>
+              <a:t>ArrayList</a:t>
+            </a:r>
+            <a:r>
               <a:rPr lang="en-US" sz="2400" dirty="0">
                 <a:latin typeface="Courier New" panose="02070309020205020404" pitchFamily="49" charset="0"/>
                 <a:cs typeface="Courier New" panose="02070309020205020404" pitchFamily="49" charset="0"/>
               </a:rPr>
-              <a:t>Predict the output for:</a:t>
+              <a:t>&lt;String&gt; </a:t>
+            </a:r>
+            <a:r>
+              <a:rPr lang="en-US" sz="2400" dirty="0" err="1">
+                <a:latin typeface="Courier New" panose="02070309020205020404" pitchFamily="49" charset="0"/>
+                <a:cs typeface="Courier New" panose="02070309020205020404" pitchFamily="49" charset="0"/>
+              </a:rPr>
+              <a:t>spongebob</a:t>
+            </a:r>
+            <a:r>
+              <a:rPr lang="en-US" sz="2400" dirty="0">
+                <a:latin typeface="Courier New" panose="02070309020205020404" pitchFamily="49" charset="0"/>
+                <a:cs typeface="Courier New" panose="02070309020205020404" pitchFamily="49" charset="0"/>
+              </a:rPr>
+              <a:t> = new </a:t>
+            </a:r>
+            <a:r>
+              <a:rPr lang="en-US" sz="2400" dirty="0" err="1">
+                <a:latin typeface="Courier New" panose="02070309020205020404" pitchFamily="49" charset="0"/>
+                <a:cs typeface="Courier New" panose="02070309020205020404" pitchFamily="49" charset="0"/>
+              </a:rPr>
+              <a:t>ArrayList</a:t>
+            </a:r>
+            <a:r>
+              <a:rPr lang="en-US" sz="2400" dirty="0">
+                <a:latin typeface="Courier New" panose="02070309020205020404" pitchFamily="49" charset="0"/>
+                <a:cs typeface="Courier New" panose="02070309020205020404" pitchFamily="49" charset="0"/>
+              </a:rPr>
+              <a:t>&lt;String&gt;();</a:t>
             </a:r>
           </a:p>
           <a:p>
             <a:pPr marL="0" indent="0">
               <a:buNone/>
             </a:pPr>
-            <a:r>
-              <a:rPr lang="en-US" sz="2400" dirty="0" err="1">
-                <a:latin typeface="Courier New" panose="02070309020205020404" pitchFamily="49" charset="0"/>
-                <a:cs typeface="Courier New" panose="02070309020205020404" pitchFamily="49" charset="0"/>
-              </a:rPr>
-              <a:t>System.out.println</a:t>
-            </a:r>
-            <a:r>
-              <a:rPr lang="en-US" sz="2400" dirty="0">
-                <a:latin typeface="Courier New" panose="02070309020205020404" pitchFamily="49" charset="0"/>
-                <a:cs typeface="Courier New" panose="02070309020205020404" pitchFamily="49" charset="0"/>
-              </a:rPr>
-              <a:t>(“Some of the character on </a:t>
-            </a:r>
-            <a:r>
-              <a:rPr lang="en-US" sz="2400" dirty="0" err="1">
-                <a:latin typeface="Courier New" panose="02070309020205020404" pitchFamily="49" charset="0"/>
-                <a:cs typeface="Courier New" panose="02070309020205020404" pitchFamily="49" charset="0"/>
-              </a:rPr>
-              <a:t>Spongebob</a:t>
-            </a:r>
             <a:endParaRPr lang="en-US" sz="2400" dirty="0">
               <a:latin typeface="Courier New" panose="02070309020205020404" pitchFamily="49" charset="0"/>
               <a:cs typeface="Courier New" panose="02070309020205020404" pitchFamily="49" charset="0"/>
@@ -41836,34 +41761,17 @@
             <a:pPr marL="0" indent="0">
               <a:buNone/>
             </a:pPr>
-            <a:r>
-              <a:rPr lang="en-US" sz="2400" dirty="0">
-                <a:latin typeface="Courier New" panose="02070309020205020404" pitchFamily="49" charset="0"/>
-                <a:cs typeface="Courier New" panose="02070309020205020404" pitchFamily="49" charset="0"/>
-              </a:rPr>
-              <a:t>	+	are” + </a:t>
-            </a:r>
-            <a:r>
-              <a:rPr lang="en-US" sz="2400" dirty="0" err="1">
-                <a:latin typeface="Courier New" panose="02070309020205020404" pitchFamily="49" charset="0"/>
-                <a:cs typeface="Courier New" panose="02070309020205020404" pitchFamily="49" charset="0"/>
-              </a:rPr>
-              <a:t>spongebob</a:t>
-            </a:r>
-            <a:r>
-              <a:rPr lang="en-US" sz="2400" dirty="0">
-                <a:latin typeface="Courier New" panose="02070309020205020404" pitchFamily="49" charset="0"/>
-                <a:cs typeface="Courier New" panose="02070309020205020404" pitchFamily="49" charset="0"/>
-              </a:rPr>
-              <a:t>);</a:t>
-            </a:r>
+            <a:endParaRPr lang="en-US" sz="2400" dirty="0">
+              <a:latin typeface="Courier New" panose="02070309020205020404" pitchFamily="49" charset="0"/>
+              <a:cs typeface="Courier New" panose="02070309020205020404" pitchFamily="49" charset="0"/>
+            </a:endParaRPr>
           </a:p>
         </p:txBody>
       </p:sp>
     </p:spTree>
     <p:extLst>
       <p:ext uri="{BB962C8B-B14F-4D97-AF65-F5344CB8AC3E}">
-        <p14:creationId xmlns:p14="http://schemas.microsoft.com/office/powerpoint/2010/main" val="308180744"/>
+        <p14:creationId xmlns:p14="http://schemas.microsoft.com/office/powerpoint/2010/main" val="4230593330"/>
       </p:ext>
     </p:extLst>
   </p:cSld>
@@ -41942,14 +41850,118 @@
                 <a:latin typeface="Courier New" panose="02070309020205020404" pitchFamily="49" charset="0"/>
                 <a:cs typeface="Courier New" panose="02070309020205020404" pitchFamily="49" charset="0"/>
               </a:rPr>
-              <a:t>spongebob.remove</a:t>
+              <a:t>spongebob.add</a:t>
             </a:r>
             <a:r>
               <a:rPr lang="en-US" sz="2400" dirty="0">
                 <a:latin typeface="Courier New" panose="02070309020205020404" pitchFamily="49" charset="0"/>
                 <a:cs typeface="Courier New" panose="02070309020205020404" pitchFamily="49" charset="0"/>
               </a:rPr>
-              <a:t>(3); //Pikachu is stored at index 3</a:t>
+              <a:t>(“Patrick Star”);</a:t>
+            </a:r>
+          </a:p>
+          <a:p>
+            <a:pPr marL="0" indent="0">
+              <a:buNone/>
+            </a:pPr>
+            <a:r>
+              <a:rPr lang="en-US" sz="2400" dirty="0" err="1">
+                <a:latin typeface="Courier New" panose="02070309020205020404" pitchFamily="49" charset="0"/>
+                <a:cs typeface="Courier New" panose="02070309020205020404" pitchFamily="49" charset="0"/>
+              </a:rPr>
+              <a:t>spongebob.add</a:t>
+            </a:r>
+            <a:r>
+              <a:rPr lang="en-US" sz="2400" dirty="0">
+                <a:latin typeface="Courier New" panose="02070309020205020404" pitchFamily="49" charset="0"/>
+                <a:cs typeface="Courier New" panose="02070309020205020404" pitchFamily="49" charset="0"/>
+              </a:rPr>
+              <a:t>(“</a:t>
+            </a:r>
+            <a:r>
+              <a:rPr lang="en-US" sz="2400" dirty="0" err="1">
+                <a:latin typeface="Courier New" panose="02070309020205020404" pitchFamily="49" charset="0"/>
+                <a:cs typeface="Courier New" panose="02070309020205020404" pitchFamily="49" charset="0"/>
+              </a:rPr>
+              <a:t>Squidward</a:t>
+            </a:r>
+            <a:r>
+              <a:rPr lang="en-US" sz="2400" dirty="0">
+                <a:latin typeface="Courier New" panose="02070309020205020404" pitchFamily="49" charset="0"/>
+                <a:cs typeface="Courier New" panose="02070309020205020404" pitchFamily="49" charset="0"/>
+              </a:rPr>
+              <a:t> Tentacles”);</a:t>
+            </a:r>
+          </a:p>
+          <a:p>
+            <a:pPr marL="0" indent="0">
+              <a:buNone/>
+            </a:pPr>
+            <a:r>
+              <a:rPr lang="en-US" sz="2400" dirty="0" err="1">
+                <a:latin typeface="Courier New" panose="02070309020205020404" pitchFamily="49" charset="0"/>
+                <a:cs typeface="Courier New" panose="02070309020205020404" pitchFamily="49" charset="0"/>
+              </a:rPr>
+              <a:t>spongebob.add</a:t>
+            </a:r>
+            <a:r>
+              <a:rPr lang="en-US" sz="2400" dirty="0">
+                <a:latin typeface="Courier New" panose="02070309020205020404" pitchFamily="49" charset="0"/>
+                <a:cs typeface="Courier New" panose="02070309020205020404" pitchFamily="49" charset="0"/>
+              </a:rPr>
+              <a:t>(“Mr. </a:t>
+            </a:r>
+            <a:r>
+              <a:rPr lang="en-US" sz="2400" dirty="0" err="1">
+                <a:latin typeface="Courier New" panose="02070309020205020404" pitchFamily="49" charset="0"/>
+                <a:cs typeface="Courier New" panose="02070309020205020404" pitchFamily="49" charset="0"/>
+              </a:rPr>
+              <a:t>Krabs</a:t>
+            </a:r>
+            <a:r>
+              <a:rPr lang="en-US" sz="2400" dirty="0">
+                <a:latin typeface="Courier New" panose="02070309020205020404" pitchFamily="49" charset="0"/>
+                <a:cs typeface="Courier New" panose="02070309020205020404" pitchFamily="49" charset="0"/>
+              </a:rPr>
+              <a:t>”);</a:t>
+            </a:r>
+          </a:p>
+          <a:p>
+            <a:pPr marL="0" indent="0">
+              <a:buNone/>
+            </a:pPr>
+            <a:r>
+              <a:rPr lang="en-US" sz="2400" dirty="0" err="1">
+                <a:latin typeface="Courier New" panose="02070309020205020404" pitchFamily="49" charset="0"/>
+                <a:cs typeface="Courier New" panose="02070309020205020404" pitchFamily="49" charset="0"/>
+              </a:rPr>
+              <a:t>spongebob.add</a:t>
+            </a:r>
+            <a:r>
+              <a:rPr lang="en-US" sz="2400" dirty="0">
+                <a:latin typeface="Courier New" panose="02070309020205020404" pitchFamily="49" charset="0"/>
+                <a:cs typeface="Courier New" panose="02070309020205020404" pitchFamily="49" charset="0"/>
+              </a:rPr>
+              <a:t>(“Pikachu”);</a:t>
+            </a:r>
+          </a:p>
+          <a:p>
+            <a:pPr marL="0" indent="0">
+              <a:buNone/>
+            </a:pPr>
+            <a:r>
+              <a:rPr lang="en-US" sz="2400" dirty="0" err="1">
+                <a:latin typeface="Courier New" panose="02070309020205020404" pitchFamily="49" charset="0"/>
+                <a:cs typeface="Courier New" panose="02070309020205020404" pitchFamily="49" charset="0"/>
+              </a:rPr>
+              <a:t>spongebob.add</a:t>
+            </a:r>
+            <a:r>
+              <a:rPr lang="en-US" sz="2400" dirty="0">
+                <a:latin typeface="Courier New" panose="02070309020205020404" pitchFamily="49" charset="0"/>
+                <a:cs typeface="Courier New" panose="02070309020205020404" pitchFamily="49" charset="0"/>
+              </a:rPr>
+              <a:t>(“Sandy Cheeks”);</a:t>
             </a:r>
           </a:p>
           <a:p>
@@ -41966,53 +41978,75 @@
               <a:buNone/>
             </a:pPr>
             <a:r>
-              <a:rPr lang="en-US" sz="2400" dirty="0" err="1">
-                <a:latin typeface="Courier New" panose="02070309020205020404" pitchFamily="49" charset="0"/>
-                <a:cs typeface="Courier New" panose="02070309020205020404" pitchFamily="49" charset="0"/>
-              </a:rPr>
-              <a:t>spongebob.add</a:t>
-            </a:r>
-            <a:r>
               <a:rPr lang="en-US" sz="2400" dirty="0">
                 <a:latin typeface="Courier New" panose="02070309020205020404" pitchFamily="49" charset="0"/>
                 <a:cs typeface="Courier New" panose="02070309020205020404" pitchFamily="49" charset="0"/>
               </a:rPr>
-              <a:t>(3, “Plankton”); </a:t>
+              <a:t>Predict the output for:</a:t>
             </a:r>
           </a:p>
           <a:p>
             <a:pPr marL="0" indent="0">
               <a:buNone/>
             </a:pPr>
-            <a:endParaRPr lang="en-US" sz="2400">
-              <a:latin typeface="Courier New" panose="02070309020205020404" pitchFamily="49" charset="0"/>
-              <a:cs typeface="Courier New" panose="02070309020205020404" pitchFamily="49" charset="0"/>
-            </a:endParaRPr>
-          </a:p>
-          <a:p>
-            <a:pPr marL="0" indent="0">
-              <a:buNone/>
-            </a:pPr>
-            <a:endParaRPr lang="en-US" sz="2400">
-              <a:latin typeface="Courier New" panose="02070309020205020404" pitchFamily="49" charset="0"/>
-              <a:cs typeface="Courier New" panose="02070309020205020404" pitchFamily="49" charset="0"/>
-            </a:endParaRPr>
-          </a:p>
-          <a:p>
-            <a:pPr marL="0" indent="0">
-              <a:buNone/>
-            </a:pPr>
+            <a:r>
+              <a:rPr lang="en-US" sz="2400" dirty="0" err="1">
+                <a:latin typeface="Courier New" panose="02070309020205020404" pitchFamily="49" charset="0"/>
+                <a:cs typeface="Courier New" panose="02070309020205020404" pitchFamily="49" charset="0"/>
+              </a:rPr>
+              <a:t>System.out.println</a:t>
+            </a:r>
+            <a:r>
+              <a:rPr lang="en-US" sz="2400" dirty="0">
+                <a:latin typeface="Courier New" panose="02070309020205020404" pitchFamily="49" charset="0"/>
+                <a:cs typeface="Courier New" panose="02070309020205020404" pitchFamily="49" charset="0"/>
+              </a:rPr>
+              <a:t>(“Some of the character on </a:t>
+            </a:r>
+            <a:r>
+              <a:rPr lang="en-US" sz="2400" dirty="0" err="1">
+                <a:latin typeface="Courier New" panose="02070309020205020404" pitchFamily="49" charset="0"/>
+                <a:cs typeface="Courier New" panose="02070309020205020404" pitchFamily="49" charset="0"/>
+              </a:rPr>
+              <a:t>Spongebob</a:t>
+            </a:r>
             <a:endParaRPr lang="en-US" sz="2400" dirty="0">
               <a:latin typeface="Courier New" panose="02070309020205020404" pitchFamily="49" charset="0"/>
               <a:cs typeface="Courier New" panose="02070309020205020404" pitchFamily="49" charset="0"/>
             </a:endParaRPr>
+          </a:p>
+          <a:p>
+            <a:pPr marL="0" indent="0">
+              <a:buNone/>
+            </a:pPr>
+            <a:r>
+              <a:rPr lang="en-US" sz="2400" dirty="0">
+                <a:latin typeface="Courier New" panose="02070309020205020404" pitchFamily="49" charset="0"/>
+                <a:cs typeface="Courier New" panose="02070309020205020404" pitchFamily="49" charset="0"/>
+              </a:rPr>
+              <a:t>	+	are” + </a:t>
+            </a:r>
+            <a:r>
+              <a:rPr lang="en-US" sz="2400" dirty="0" err="1">
+                <a:latin typeface="Courier New" panose="02070309020205020404" pitchFamily="49" charset="0"/>
+                <a:cs typeface="Courier New" panose="02070309020205020404" pitchFamily="49" charset="0"/>
+              </a:rPr>
+              <a:t>spongebob</a:t>
+            </a:r>
+            <a:r>
+              <a:rPr lang="en-US" sz="2400" dirty="0">
+                <a:latin typeface="Courier New" panose="02070309020205020404" pitchFamily="49" charset="0"/>
+                <a:cs typeface="Courier New" panose="02070309020205020404" pitchFamily="49" charset="0"/>
+              </a:rPr>
+              <a:t>);</a:t>
+            </a:r>
           </a:p>
         </p:txBody>
       </p:sp>
     </p:spTree>
     <p:extLst>
       <p:ext uri="{BB962C8B-B14F-4D97-AF65-F5344CB8AC3E}">
-        <p14:creationId xmlns:p14="http://schemas.microsoft.com/office/powerpoint/2010/main" val="3593238148"/>
+        <p14:creationId xmlns:p14="http://schemas.microsoft.com/office/powerpoint/2010/main" val="308180744"/>
       </p:ext>
     </p:extLst>
   </p:cSld>
@@ -42091,28 +42125,14 @@
                 <a:latin typeface="Courier New" panose="02070309020205020404" pitchFamily="49" charset="0"/>
                 <a:cs typeface="Courier New" panose="02070309020205020404" pitchFamily="49" charset="0"/>
               </a:rPr>
-              <a:t>System.out.println</a:t>
+              <a:t>spongebob.remove</a:t>
             </a:r>
             <a:r>
               <a:rPr lang="en-US" sz="2400" dirty="0">
                 <a:latin typeface="Courier New" panose="02070309020205020404" pitchFamily="49" charset="0"/>
                 <a:cs typeface="Courier New" panose="02070309020205020404" pitchFamily="49" charset="0"/>
               </a:rPr>
-              <a:t>(</a:t>
-            </a:r>
-            <a:r>
-              <a:rPr lang="en-US" sz="2400" dirty="0" err="1">
-                <a:latin typeface="Courier New" panose="02070309020205020404" pitchFamily="49" charset="0"/>
-                <a:cs typeface="Courier New" panose="02070309020205020404" pitchFamily="49" charset="0"/>
-              </a:rPr>
-              <a:t>spongebob.get</a:t>
-            </a:r>
-            <a:r>
-              <a:rPr lang="en-US" sz="2400" dirty="0">
-                <a:latin typeface="Courier New" panose="02070309020205020404" pitchFamily="49" charset="0"/>
-                <a:cs typeface="Courier New" panose="02070309020205020404" pitchFamily="49" charset="0"/>
-              </a:rPr>
-              <a:t>(3));</a:t>
+              <a:t>(3); //Pikachu is stored at index 3</a:t>
             </a:r>
           </a:p>
           <a:p>
@@ -42133,29 +42153,33 @@
                 <a:latin typeface="Courier New" panose="02070309020205020404" pitchFamily="49" charset="0"/>
                 <a:cs typeface="Courier New" panose="02070309020205020404" pitchFamily="49" charset="0"/>
               </a:rPr>
-              <a:t>System.out.println</a:t>
+              <a:t>spongebob.add</a:t>
             </a:r>
             <a:r>
               <a:rPr lang="en-US" sz="2400" dirty="0">
                 <a:latin typeface="Courier New" panose="02070309020205020404" pitchFamily="49" charset="0"/>
                 <a:cs typeface="Courier New" panose="02070309020205020404" pitchFamily="49" charset="0"/>
               </a:rPr>
-              <a:t>(</a:t>
-            </a:r>
-            <a:r>
-              <a:rPr lang="en-US" sz="2400" dirty="0" err="1">
-                <a:latin typeface="Courier New" panose="02070309020205020404" pitchFamily="49" charset="0"/>
-                <a:cs typeface="Courier New" panose="02070309020205020404" pitchFamily="49" charset="0"/>
-              </a:rPr>
-              <a:t>spongebob.size</a:t>
-            </a:r>
-            <a:r>
-              <a:rPr lang="en-US" sz="2400" dirty="0">
-                <a:latin typeface="Courier New" panose="02070309020205020404" pitchFamily="49" charset="0"/>
-                <a:cs typeface="Courier New" panose="02070309020205020404" pitchFamily="49" charset="0"/>
-              </a:rPr>
-              <a:t>());</a:t>
-            </a:r>
+              <a:t>(3, “Plankton”); </a:t>
+            </a:r>
+          </a:p>
+          <a:p>
+            <a:pPr marL="0" indent="0">
+              <a:buNone/>
+            </a:pPr>
+            <a:endParaRPr lang="en-US" sz="2400">
+              <a:latin typeface="Courier New" panose="02070309020205020404" pitchFamily="49" charset="0"/>
+              <a:cs typeface="Courier New" panose="02070309020205020404" pitchFamily="49" charset="0"/>
+            </a:endParaRPr>
+          </a:p>
+          <a:p>
+            <a:pPr marL="0" indent="0">
+              <a:buNone/>
+            </a:pPr>
+            <a:endParaRPr lang="en-US" sz="2400">
+              <a:latin typeface="Courier New" panose="02070309020205020404" pitchFamily="49" charset="0"/>
+              <a:cs typeface="Courier New" panose="02070309020205020404" pitchFamily="49" charset="0"/>
+            </a:endParaRPr>
           </a:p>
           <a:p>
             <a:pPr marL="0" indent="0">
@@ -42166,86 +42190,12 @@
               <a:cs typeface="Courier New" panose="02070309020205020404" pitchFamily="49" charset="0"/>
             </a:endParaRPr>
           </a:p>
-          <a:p>
-            <a:pPr marL="0" indent="0">
-              <a:buNone/>
-            </a:pPr>
-            <a:r>
-              <a:rPr lang="en-US" sz="2400" dirty="0" err="1">
-                <a:latin typeface="Courier New" panose="02070309020205020404" pitchFamily="49" charset="0"/>
-                <a:cs typeface="Courier New" panose="02070309020205020404" pitchFamily="49" charset="0"/>
-              </a:rPr>
-              <a:t>spongebob.set</a:t>
-            </a:r>
-            <a:r>
-              <a:rPr lang="en-US" sz="2400" dirty="0">
-                <a:latin typeface="Courier New" panose="02070309020205020404" pitchFamily="49" charset="0"/>
-                <a:cs typeface="Courier New" panose="02070309020205020404" pitchFamily="49" charset="0"/>
-              </a:rPr>
-              <a:t>(3, “Plankton”);</a:t>
-            </a:r>
-          </a:p>
-          <a:p>
-            <a:pPr marL="0" indent="0">
-              <a:buNone/>
-            </a:pPr>
-            <a:endParaRPr lang="en-US" sz="2400" dirty="0">
-              <a:latin typeface="Courier New" panose="02070309020205020404" pitchFamily="49" charset="0"/>
-              <a:cs typeface="Courier New" panose="02070309020205020404" pitchFamily="49" charset="0"/>
-            </a:endParaRPr>
-          </a:p>
-          <a:p>
-            <a:pPr marL="0" indent="0">
-              <a:buNone/>
-            </a:pPr>
-            <a:r>
-              <a:rPr lang="en-US" sz="2400" dirty="0" err="1">
-                <a:latin typeface="Courier New" panose="02070309020205020404" pitchFamily="49" charset="0"/>
-                <a:cs typeface="Courier New" panose="02070309020205020404" pitchFamily="49" charset="0"/>
-              </a:rPr>
-              <a:t>spongebob.clear</a:t>
-            </a:r>
-            <a:r>
-              <a:rPr lang="en-US" sz="2400" dirty="0">
-                <a:latin typeface="Courier New" panose="02070309020205020404" pitchFamily="49" charset="0"/>
-                <a:cs typeface="Courier New" panose="02070309020205020404" pitchFamily="49" charset="0"/>
-              </a:rPr>
-              <a:t>();</a:t>
-            </a:r>
-          </a:p>
-          <a:p>
-            <a:pPr marL="0" indent="0">
-              <a:buNone/>
-            </a:pPr>
-            <a:endParaRPr lang="en-US" sz="2400" dirty="0">
-              <a:latin typeface="Courier New" panose="02070309020205020404" pitchFamily="49" charset="0"/>
-              <a:cs typeface="Courier New" panose="02070309020205020404" pitchFamily="49" charset="0"/>
-            </a:endParaRPr>
-          </a:p>
-          <a:p>
-            <a:pPr marL="0" indent="0">
-              <a:buNone/>
-            </a:pPr>
-            <a:endParaRPr lang="en-US" sz="2400" dirty="0">
-              <a:latin typeface="Courier New" panose="02070309020205020404" pitchFamily="49" charset="0"/>
-              <a:cs typeface="Courier New" panose="02070309020205020404" pitchFamily="49" charset="0"/>
-            </a:endParaRPr>
-          </a:p>
-          <a:p>
-            <a:pPr marL="0" indent="0">
-              <a:buNone/>
-            </a:pPr>
-            <a:endParaRPr lang="en-US" sz="2400" dirty="0">
-              <a:latin typeface="Courier New" panose="02070309020205020404" pitchFamily="49" charset="0"/>
-              <a:cs typeface="Courier New" panose="02070309020205020404" pitchFamily="49" charset="0"/>
-            </a:endParaRPr>
-          </a:p>
         </p:txBody>
       </p:sp>
     </p:spTree>
     <p:extLst>
       <p:ext uri="{BB962C8B-B14F-4D97-AF65-F5344CB8AC3E}">
-        <p14:creationId xmlns:p14="http://schemas.microsoft.com/office/powerpoint/2010/main" val="1654426926"/>
+        <p14:creationId xmlns:p14="http://schemas.microsoft.com/office/powerpoint/2010/main" val="3593238148"/>
       </p:ext>
     </p:extLst>
   </p:cSld>
@@ -42324,6 +42274,239 @@
                 <a:latin typeface="Courier New" panose="02070309020205020404" pitchFamily="49" charset="0"/>
                 <a:cs typeface="Courier New" panose="02070309020205020404" pitchFamily="49" charset="0"/>
               </a:rPr>
+              <a:t>System.out.println</a:t>
+            </a:r>
+            <a:r>
+              <a:rPr lang="en-US" sz="2400" dirty="0">
+                <a:latin typeface="Courier New" panose="02070309020205020404" pitchFamily="49" charset="0"/>
+                <a:cs typeface="Courier New" panose="02070309020205020404" pitchFamily="49" charset="0"/>
+              </a:rPr>
+              <a:t>(</a:t>
+            </a:r>
+            <a:r>
+              <a:rPr lang="en-US" sz="2400" dirty="0" err="1">
+                <a:latin typeface="Courier New" panose="02070309020205020404" pitchFamily="49" charset="0"/>
+                <a:cs typeface="Courier New" panose="02070309020205020404" pitchFamily="49" charset="0"/>
+              </a:rPr>
+              <a:t>spongebob.get</a:t>
+            </a:r>
+            <a:r>
+              <a:rPr lang="en-US" sz="2400" dirty="0">
+                <a:latin typeface="Courier New" panose="02070309020205020404" pitchFamily="49" charset="0"/>
+                <a:cs typeface="Courier New" panose="02070309020205020404" pitchFamily="49" charset="0"/>
+              </a:rPr>
+              <a:t>(3));</a:t>
+            </a:r>
+          </a:p>
+          <a:p>
+            <a:pPr marL="0" indent="0">
+              <a:buNone/>
+            </a:pPr>
+            <a:endParaRPr lang="en-US" sz="2400" dirty="0">
+              <a:latin typeface="Courier New" panose="02070309020205020404" pitchFamily="49" charset="0"/>
+              <a:cs typeface="Courier New" panose="02070309020205020404" pitchFamily="49" charset="0"/>
+            </a:endParaRPr>
+          </a:p>
+          <a:p>
+            <a:pPr marL="0" indent="0">
+              <a:buNone/>
+            </a:pPr>
+            <a:r>
+              <a:rPr lang="en-US" sz="2400" dirty="0" err="1">
+                <a:latin typeface="Courier New" panose="02070309020205020404" pitchFamily="49" charset="0"/>
+                <a:cs typeface="Courier New" panose="02070309020205020404" pitchFamily="49" charset="0"/>
+              </a:rPr>
+              <a:t>System.out.println</a:t>
+            </a:r>
+            <a:r>
+              <a:rPr lang="en-US" sz="2400" dirty="0">
+                <a:latin typeface="Courier New" panose="02070309020205020404" pitchFamily="49" charset="0"/>
+                <a:cs typeface="Courier New" panose="02070309020205020404" pitchFamily="49" charset="0"/>
+              </a:rPr>
+              <a:t>(</a:t>
+            </a:r>
+            <a:r>
+              <a:rPr lang="en-US" sz="2400" dirty="0" err="1">
+                <a:latin typeface="Courier New" panose="02070309020205020404" pitchFamily="49" charset="0"/>
+                <a:cs typeface="Courier New" panose="02070309020205020404" pitchFamily="49" charset="0"/>
+              </a:rPr>
+              <a:t>spongebob.size</a:t>
+            </a:r>
+            <a:r>
+              <a:rPr lang="en-US" sz="2400" dirty="0">
+                <a:latin typeface="Courier New" panose="02070309020205020404" pitchFamily="49" charset="0"/>
+                <a:cs typeface="Courier New" panose="02070309020205020404" pitchFamily="49" charset="0"/>
+              </a:rPr>
+              <a:t>());</a:t>
+            </a:r>
+          </a:p>
+          <a:p>
+            <a:pPr marL="0" indent="0">
+              <a:buNone/>
+            </a:pPr>
+            <a:endParaRPr lang="en-US" sz="2400" dirty="0">
+              <a:latin typeface="Courier New" panose="02070309020205020404" pitchFamily="49" charset="0"/>
+              <a:cs typeface="Courier New" panose="02070309020205020404" pitchFamily="49" charset="0"/>
+            </a:endParaRPr>
+          </a:p>
+          <a:p>
+            <a:pPr marL="0" indent="0">
+              <a:buNone/>
+            </a:pPr>
+            <a:r>
+              <a:rPr lang="en-US" sz="2400" dirty="0" err="1">
+                <a:latin typeface="Courier New" panose="02070309020205020404" pitchFamily="49" charset="0"/>
+                <a:cs typeface="Courier New" panose="02070309020205020404" pitchFamily="49" charset="0"/>
+              </a:rPr>
+              <a:t>spongebob.set</a:t>
+            </a:r>
+            <a:r>
+              <a:rPr lang="en-US" sz="2400" dirty="0">
+                <a:latin typeface="Courier New" panose="02070309020205020404" pitchFamily="49" charset="0"/>
+                <a:cs typeface="Courier New" panose="02070309020205020404" pitchFamily="49" charset="0"/>
+              </a:rPr>
+              <a:t>(3, “Plankton”);</a:t>
+            </a:r>
+          </a:p>
+          <a:p>
+            <a:pPr marL="0" indent="0">
+              <a:buNone/>
+            </a:pPr>
+            <a:endParaRPr lang="en-US" sz="2400" dirty="0">
+              <a:latin typeface="Courier New" panose="02070309020205020404" pitchFamily="49" charset="0"/>
+              <a:cs typeface="Courier New" panose="02070309020205020404" pitchFamily="49" charset="0"/>
+            </a:endParaRPr>
+          </a:p>
+          <a:p>
+            <a:pPr marL="0" indent="0">
+              <a:buNone/>
+            </a:pPr>
+            <a:r>
+              <a:rPr lang="en-US" sz="2400" dirty="0" err="1">
+                <a:latin typeface="Courier New" panose="02070309020205020404" pitchFamily="49" charset="0"/>
+                <a:cs typeface="Courier New" panose="02070309020205020404" pitchFamily="49" charset="0"/>
+              </a:rPr>
+              <a:t>spongebob.clear</a:t>
+            </a:r>
+            <a:r>
+              <a:rPr lang="en-US" sz="2400" dirty="0">
+                <a:latin typeface="Courier New" panose="02070309020205020404" pitchFamily="49" charset="0"/>
+                <a:cs typeface="Courier New" panose="02070309020205020404" pitchFamily="49" charset="0"/>
+              </a:rPr>
+              <a:t>();</a:t>
+            </a:r>
+          </a:p>
+          <a:p>
+            <a:pPr marL="0" indent="0">
+              <a:buNone/>
+            </a:pPr>
+            <a:endParaRPr lang="en-US" sz="2400" dirty="0">
+              <a:latin typeface="Courier New" panose="02070309020205020404" pitchFamily="49" charset="0"/>
+              <a:cs typeface="Courier New" panose="02070309020205020404" pitchFamily="49" charset="0"/>
+            </a:endParaRPr>
+          </a:p>
+          <a:p>
+            <a:pPr marL="0" indent="0">
+              <a:buNone/>
+            </a:pPr>
+            <a:endParaRPr lang="en-US" sz="2400" dirty="0">
+              <a:latin typeface="Courier New" panose="02070309020205020404" pitchFamily="49" charset="0"/>
+              <a:cs typeface="Courier New" panose="02070309020205020404" pitchFamily="49" charset="0"/>
+            </a:endParaRPr>
+          </a:p>
+          <a:p>
+            <a:pPr marL="0" indent="0">
+              <a:buNone/>
+            </a:pPr>
+            <a:endParaRPr lang="en-US" sz="2400" dirty="0">
+              <a:latin typeface="Courier New" panose="02070309020205020404" pitchFamily="49" charset="0"/>
+              <a:cs typeface="Courier New" panose="02070309020205020404" pitchFamily="49" charset="0"/>
+            </a:endParaRPr>
+          </a:p>
+        </p:txBody>
+      </p:sp>
+    </p:spTree>
+    <p:extLst>
+      <p:ext uri="{BB962C8B-B14F-4D97-AF65-F5344CB8AC3E}">
+        <p14:creationId xmlns:p14="http://schemas.microsoft.com/office/powerpoint/2010/main" val="1654426926"/>
+      </p:ext>
+    </p:extLst>
+  </p:cSld>
+  <p:clrMapOvr>
+    <a:masterClrMapping/>
+  </p:clrMapOvr>
+</p:sld>
+</file>
+
+<file path=ppt/slides/slide66.xml><?xml version="1.0" encoding="utf-8"?>
+<p:sld xmlns:a="http://schemas.openxmlformats.org/drawingml/2006/main" xmlns:r="http://schemas.openxmlformats.org/officeDocument/2006/relationships" xmlns:p="http://schemas.openxmlformats.org/presentationml/2006/main">
+  <p:cSld>
+    <p:spTree>
+      <p:nvGrpSpPr>
+        <p:cNvPr id="1" name=""/>
+        <p:cNvGrpSpPr/>
+        <p:nvPr/>
+      </p:nvGrpSpPr>
+      <p:grpSpPr>
+        <a:xfrm>
+          <a:off x="0" y="0"/>
+          <a:ext cx="0" cy="0"/>
+          <a:chOff x="0" y="0"/>
+          <a:chExt cx="0" cy="0"/>
+        </a:xfrm>
+      </p:grpSpPr>
+      <p:sp>
+        <p:nvSpPr>
+          <p:cNvPr id="2" name="Title 1"/>
+          <p:cNvSpPr>
+            <a:spLocks noGrp="1"/>
+          </p:cNvSpPr>
+          <p:nvPr>
+            <p:ph type="title"/>
+          </p:nvPr>
+        </p:nvSpPr>
+        <p:spPr/>
+        <p:txBody>
+          <a:bodyPr/>
+          <a:lstStyle/>
+          <a:p>
+            <a:r>
+              <a:rPr lang="en-US" dirty="0"/>
+              <a:t>The </a:t>
+            </a:r>
+            <a:r>
+              <a:rPr lang="en-US" dirty="0" err="1"/>
+              <a:t>ArrayList</a:t>
+            </a:r>
+            <a:endParaRPr lang="en-US" dirty="0"/>
+          </a:p>
+        </p:txBody>
+      </p:sp>
+      <p:sp>
+        <p:nvSpPr>
+          <p:cNvPr id="3" name="Content Placeholder 2"/>
+          <p:cNvSpPr>
+            <a:spLocks noGrp="1"/>
+          </p:cNvSpPr>
+          <p:nvPr>
+            <p:ph idx="1"/>
+          </p:nvPr>
+        </p:nvSpPr>
+        <p:spPr/>
+        <p:txBody>
+          <a:bodyPr>
+            <a:normAutofit/>
+          </a:bodyPr>
+          <a:lstStyle/>
+          <a:p>
+            <a:pPr marL="0" indent="0">
+              <a:buNone/>
+            </a:pPr>
+            <a:r>
+              <a:rPr lang="en-US" sz="2400" dirty="0" err="1">
+                <a:latin typeface="Courier New" panose="02070309020205020404" pitchFamily="49" charset="0"/>
+                <a:cs typeface="Courier New" panose="02070309020205020404" pitchFamily="49" charset="0"/>
+              </a:rPr>
               <a:t>int</a:t>
             </a:r>
             <a:r>
@@ -42532,7 +42715,7 @@
 </p:sld>
 </file>
 
-<file path=ppt/slides/slide66.xml><?xml version="1.0" encoding="utf-8"?>
+<file path=ppt/slides/slide67.xml><?xml version="1.0" encoding="utf-8"?>
 <p:sld xmlns:a="http://schemas.openxmlformats.org/drawingml/2006/main" xmlns:r="http://schemas.openxmlformats.org/officeDocument/2006/relationships" xmlns:p="http://schemas.openxmlformats.org/presentationml/2006/main">
   <p:cSld>
     <p:spTree>
@@ -42590,7 +42773,7 @@
 </p:sld>
 </file>
 
-<file path=ppt/slides/slide67.xml><?xml version="1.0" encoding="utf-8"?>
+<file path=ppt/slides/slide68.xml><?xml version="1.0" encoding="utf-8"?>
 <p:sld xmlns:a="http://schemas.openxmlformats.org/drawingml/2006/main" xmlns:r="http://schemas.openxmlformats.org/officeDocument/2006/relationships" xmlns:p="http://schemas.openxmlformats.org/presentationml/2006/main">
   <p:cSld>
     <p:spTree>
@@ -42683,80 +42866,6 @@
     <p:extLst>
       <p:ext uri="{BB962C8B-B14F-4D97-AF65-F5344CB8AC3E}">
         <p14:creationId xmlns:p14="http://schemas.microsoft.com/office/powerpoint/2010/main" val="2304683034"/>
-      </p:ext>
-    </p:extLst>
-  </p:cSld>
-  <p:clrMapOvr>
-    <a:masterClrMapping/>
-  </p:clrMapOvr>
-</p:sld>
-</file>
-
-<file path=ppt/slides/slide68.xml><?xml version="1.0" encoding="utf-8"?>
-<p:sld xmlns:a="http://schemas.openxmlformats.org/drawingml/2006/main" xmlns:r="http://schemas.openxmlformats.org/officeDocument/2006/relationships" xmlns:p="http://schemas.openxmlformats.org/presentationml/2006/main">
-  <p:cSld>
-    <p:spTree>
-      <p:nvGrpSpPr>
-        <p:cNvPr id="1" name=""/>
-        <p:cNvGrpSpPr/>
-        <p:nvPr/>
-      </p:nvGrpSpPr>
-      <p:grpSpPr>
-        <a:xfrm>
-          <a:off x="0" y="0"/>
-          <a:ext cx="0" cy="0"/>
-          <a:chOff x="0" y="0"/>
-          <a:chExt cx="0" cy="0"/>
-        </a:xfrm>
-      </p:grpSpPr>
-      <p:sp>
-        <p:nvSpPr>
-          <p:cNvPr id="2" name="Title 1"/>
-          <p:cNvSpPr>
-            <a:spLocks noGrp="1"/>
-          </p:cNvSpPr>
-          <p:nvPr>
-            <p:ph type="ctrTitle"/>
-          </p:nvPr>
-        </p:nvSpPr>
-        <p:spPr/>
-        <p:txBody>
-          <a:bodyPr/>
-          <a:lstStyle/>
-          <a:p>
-            <a:r>
-              <a:rPr lang="en-US" dirty="0"/>
-              <a:t>Finding and Fixing Errors</a:t>
-            </a:r>
-          </a:p>
-        </p:txBody>
-      </p:sp>
-      <p:sp>
-        <p:nvSpPr>
-          <p:cNvPr id="3" name="Subtitle 2"/>
-          <p:cNvSpPr>
-            <a:spLocks noGrp="1"/>
-          </p:cNvSpPr>
-          <p:nvPr>
-            <p:ph type="subTitle" idx="1"/>
-          </p:nvPr>
-        </p:nvSpPr>
-        <p:spPr/>
-        <p:txBody>
-          <a:bodyPr/>
-          <a:lstStyle/>
-          <a:p>
-            <a:r>
-              <a:rPr lang="en-US" dirty="0"/>
-              <a:t>[ 4.08 ] [ Today’s Date ] [ Instructor Name ]</a:t>
-            </a:r>
-          </a:p>
-        </p:txBody>
-      </p:sp>
-    </p:spTree>
-    <p:extLst>
-      <p:ext uri="{BB962C8B-B14F-4D97-AF65-F5344CB8AC3E}">
-        <p14:creationId xmlns:p14="http://schemas.microsoft.com/office/powerpoint/2010/main" val="3767087927"/>
       </p:ext>
     </p:extLst>
   </p:cSld>
@@ -42790,7 +42899,7 @@
             <a:spLocks noGrp="1"/>
           </p:cNvSpPr>
           <p:nvPr>
-            <p:ph type="title"/>
+            <p:ph type="ctrTitle"/>
           </p:nvPr>
         </p:nvSpPr>
         <p:spPr/>
@@ -42800,19 +42909,19 @@
           <a:p>
             <a:r>
               <a:rPr lang="en-US" dirty="0"/>
-              <a:t>Today’s plan:</a:t>
+              <a:t>Finding and Fixing Errors</a:t>
             </a:r>
           </a:p>
         </p:txBody>
       </p:sp>
       <p:sp>
         <p:nvSpPr>
-          <p:cNvPr id="3" name="Content Placeholder 2"/>
+          <p:cNvPr id="3" name="Subtitle 2"/>
           <p:cNvSpPr>
             <a:spLocks noGrp="1"/>
           </p:cNvSpPr>
           <p:nvPr>
-            <p:ph idx="1"/>
+            <p:ph type="subTitle" idx="1"/>
           </p:nvPr>
         </p:nvSpPr>
         <p:spPr/>
@@ -42820,51 +42929,9 @@
           <a:bodyPr/>
           <a:lstStyle/>
           <a:p>
-            <a:pPr marL="0" indent="0">
-              <a:buNone/>
-            </a:pPr>
             <a:r>
               <a:rPr lang="en-US" dirty="0"/>
-              <a:t>Error check and resubmit all chapter 7 and 10.1 assignments.</a:t>
-            </a:r>
-          </a:p>
-          <a:p>
-            <a:endParaRPr lang="en-US" dirty="0"/>
-          </a:p>
-          <a:p>
-            <a:pPr marL="0" indent="0">
-              <a:buNone/>
-            </a:pPr>
-            <a:r>
-              <a:rPr lang="en-US" dirty="0"/>
-              <a:t>Study for the test by:</a:t>
-            </a:r>
-          </a:p>
-          <a:p>
-            <a:pPr lvl="1"/>
-            <a:r>
-              <a:rPr lang="en-US" dirty="0"/>
-              <a:t>Reviewing all of the blue, self-check pages at the end of Chapter 7 and 10.1.</a:t>
-            </a:r>
-          </a:p>
-          <a:p>
-            <a:pPr lvl="1"/>
-            <a:r>
-              <a:rPr lang="en-US" dirty="0"/>
-              <a:t>Re-reading sections as needed to complete the self-check problems.</a:t>
-            </a:r>
-          </a:p>
-          <a:p>
-            <a:pPr lvl="1"/>
-            <a:endParaRPr lang="en-US" dirty="0"/>
-          </a:p>
-          <a:p>
-            <a:pPr marL="0" indent="0">
-              <a:buNone/>
-            </a:pPr>
-            <a:r>
-              <a:rPr lang="en-US" dirty="0"/>
-              <a:t>Submit 5 questions for review in class tomorrow.</a:t>
+              <a:t>[ 4.08 ] [ Today’s Date ] [ Instructor Name ]</a:t>
             </a:r>
           </a:p>
         </p:txBody>
@@ -42872,7 +42939,7 @@
     </p:spTree>
     <p:extLst>
       <p:ext uri="{BB962C8B-B14F-4D97-AF65-F5344CB8AC3E}">
-        <p14:creationId xmlns:p14="http://schemas.microsoft.com/office/powerpoint/2010/main" val="2500065789"/>
+        <p14:creationId xmlns:p14="http://schemas.microsoft.com/office/powerpoint/2010/main" val="3767087927"/>
       </p:ext>
     </p:extLst>
   </p:cSld>
@@ -43006,7 +43073,7 @@
           <a:p>
             <a:r>
               <a:rPr lang="en-US" dirty="0"/>
-              <a:t>Homework Regrade/Resubmit</a:t>
+              <a:t>Today’s plan:</a:t>
             </a:r>
           </a:p>
         </p:txBody>
@@ -43031,7 +43098,7 @@
             </a:pPr>
             <a:r>
               <a:rPr lang="en-US" dirty="0"/>
-              <a:t>You all have the opportunity to get full credit  on your homework grades by correcting them now, in class.</a:t>
+              <a:t>Error check and resubmit all chapter 7 and 10.1 assignments.</a:t>
             </a:r>
           </a:p>
           <a:p>
@@ -43043,22 +43110,34 @@
             </a:pPr>
             <a:r>
               <a:rPr lang="en-US" dirty="0"/>
-              <a:t>Use your error checking algorithm, and if you need help just ask!</a:t>
-            </a:r>
+              <a:t>Study for the test by:</a:t>
+            </a:r>
+          </a:p>
+          <a:p>
+            <a:pPr lvl="1"/>
+            <a:r>
+              <a:rPr lang="en-US" dirty="0"/>
+              <a:t>Reviewing all of the blue, self-check pages at the end of Chapter 7 and 10.1.</a:t>
+            </a:r>
+          </a:p>
+          <a:p>
+            <a:pPr lvl="1"/>
+            <a:r>
+              <a:rPr lang="en-US" dirty="0"/>
+              <a:t>Re-reading sections as needed to complete the self-check problems.</a:t>
+            </a:r>
+          </a:p>
+          <a:p>
+            <a:pPr lvl="1"/>
+            <a:endParaRPr lang="en-US" dirty="0"/>
           </a:p>
           <a:p>
             <a:pPr marL="0" indent="0">
               <a:buNone/>
             </a:pPr>
-            <a:endParaRPr lang="en-US" dirty="0"/>
-          </a:p>
-          <a:p>
-            <a:pPr marL="0" indent="0">
-              <a:buNone/>
-            </a:pPr>
             <a:r>
               <a:rPr lang="en-US" dirty="0"/>
-              <a:t>Make sure to check for issues with scope!</a:t>
+              <a:t>Submit 5 questions for review in class tomorrow.</a:t>
             </a:r>
           </a:p>
         </p:txBody>
@@ -43066,7 +43145,7 @@
     </p:spTree>
     <p:extLst>
       <p:ext uri="{BB962C8B-B14F-4D97-AF65-F5344CB8AC3E}">
-        <p14:creationId xmlns:p14="http://schemas.microsoft.com/office/powerpoint/2010/main" val="1523991790"/>
+        <p14:creationId xmlns:p14="http://schemas.microsoft.com/office/powerpoint/2010/main" val="2500065789"/>
       </p:ext>
     </p:extLst>
   </p:cSld>
@@ -43110,7 +43189,7 @@
           <a:p>
             <a:r>
               <a:rPr lang="en-US" dirty="0"/>
-              <a:t>Homework</a:t>
+              <a:t>Homework Regrade/Resubmit</a:t>
             </a:r>
           </a:p>
         </p:txBody>
@@ -43130,18 +43209,39 @@
           <a:bodyPr/>
           <a:lstStyle/>
           <a:p>
+            <a:pPr marL="0" indent="0">
+              <a:buNone/>
+            </a:pPr>
             <a:r>
               <a:rPr lang="en-US" dirty="0"/>
-              <a:t>Begin reviewing chapters 7 and 10.1 for the Unit Test.</a:t>
+              <a:t>You all have the opportunity to get full credit  on your homework grades by correcting them now, in class.</a:t>
             </a:r>
           </a:p>
           <a:p>
             <a:endParaRPr lang="en-US" dirty="0"/>
           </a:p>
           <a:p>
+            <a:pPr marL="0" indent="0">
+              <a:buNone/>
+            </a:pPr>
             <a:r>
               <a:rPr lang="en-US" dirty="0"/>
-              <a:t>Submit 5 questions you have for review tomorrow.</a:t>
+              <a:t>Use your error checking algorithm, and if you need help just ask!</a:t>
+            </a:r>
+          </a:p>
+          <a:p>
+            <a:pPr marL="0" indent="0">
+              <a:buNone/>
+            </a:pPr>
+            <a:endParaRPr lang="en-US" dirty="0"/>
+          </a:p>
+          <a:p>
+            <a:pPr marL="0" indent="0">
+              <a:buNone/>
+            </a:pPr>
+            <a:r>
+              <a:rPr lang="en-US" dirty="0"/>
+              <a:t>Make sure to check for issues with scope!</a:t>
             </a:r>
           </a:p>
         </p:txBody>
@@ -43149,7 +43249,7 @@
     </p:spTree>
     <p:extLst>
       <p:ext uri="{BB962C8B-B14F-4D97-AF65-F5344CB8AC3E}">
-        <p14:creationId xmlns:p14="http://schemas.microsoft.com/office/powerpoint/2010/main" val="402404205"/>
+        <p14:creationId xmlns:p14="http://schemas.microsoft.com/office/powerpoint/2010/main" val="1523991790"/>
       </p:ext>
     </p:extLst>
   </p:cSld>
@@ -43183,7 +43283,7 @@
             <a:spLocks noGrp="1"/>
           </p:cNvSpPr>
           <p:nvPr>
-            <p:ph type="ctrTitle"/>
+            <p:ph type="title"/>
           </p:nvPr>
         </p:nvSpPr>
         <p:spPr/>
@@ -43193,24 +43293,19 @@
           <a:p>
             <a:r>
               <a:rPr lang="en-US" dirty="0"/>
-              <a:t>Magpie </a:t>
-            </a:r>
-            <a:r>
-              <a:rPr lang="en-US" dirty="0" err="1"/>
-              <a:t>Chatbot</a:t>
-            </a:r>
-            <a:endParaRPr lang="en-US" dirty="0"/>
+              <a:t>Homework</a:t>
+            </a:r>
           </a:p>
         </p:txBody>
       </p:sp>
       <p:sp>
         <p:nvSpPr>
-          <p:cNvPr id="3" name="Subtitle 2"/>
+          <p:cNvPr id="3" name="Content Placeholder 2"/>
           <p:cNvSpPr>
             <a:spLocks noGrp="1"/>
           </p:cNvSpPr>
           <p:nvPr>
-            <p:ph type="subTitle" idx="1"/>
+            <p:ph idx="1"/>
           </p:nvPr>
         </p:nvSpPr>
         <p:spPr/>
@@ -43220,7 +43315,16 @@
           <a:p>
             <a:r>
               <a:rPr lang="en-US" dirty="0"/>
-              <a:t>[ 4.09 ] [ Today’s Date ] [ Instructor Name ]</a:t>
+              <a:t>Begin reviewing chapters 7 and 10.1 for the Unit Test.</a:t>
+            </a:r>
+          </a:p>
+          <a:p>
+            <a:endParaRPr lang="en-US" dirty="0"/>
+          </a:p>
+          <a:p>
+            <a:r>
+              <a:rPr lang="en-US" dirty="0"/>
+              <a:t>Submit 5 questions you have for review tomorrow.</a:t>
             </a:r>
           </a:p>
         </p:txBody>
@@ -43228,7 +43332,7 @@
     </p:spTree>
     <p:extLst>
       <p:ext uri="{BB962C8B-B14F-4D97-AF65-F5344CB8AC3E}">
-        <p14:creationId xmlns:p14="http://schemas.microsoft.com/office/powerpoint/2010/main" val="781799513"/>
+        <p14:creationId xmlns:p14="http://schemas.microsoft.com/office/powerpoint/2010/main" val="402404205"/>
       </p:ext>
     </p:extLst>
   </p:cSld>
@@ -43262,7 +43366,7 @@
             <a:spLocks noGrp="1"/>
           </p:cNvSpPr>
           <p:nvPr>
-            <p:ph type="title"/>
+            <p:ph type="ctrTitle"/>
           </p:nvPr>
         </p:nvSpPr>
         <p:spPr/>
@@ -43272,11 +43376,11 @@
           <a:p>
             <a:r>
               <a:rPr lang="en-US" dirty="0"/>
-              <a:t>Empty </a:t>
+              <a:t>Magpie </a:t>
             </a:r>
             <a:r>
               <a:rPr lang="en-US" dirty="0" err="1"/>
-              <a:t>Powerpoint</a:t>
+              <a:t>Chatbot</a:t>
             </a:r>
             <a:endParaRPr lang="en-US" dirty="0"/>
           </a:p>
@@ -43284,12 +43388,12 @@
       </p:sp>
       <p:sp>
         <p:nvSpPr>
-          <p:cNvPr id="3" name="Content Placeholder 2"/>
+          <p:cNvPr id="3" name="Subtitle 2"/>
           <p:cNvSpPr>
             <a:spLocks noGrp="1"/>
           </p:cNvSpPr>
           <p:nvPr>
-            <p:ph idx="1"/>
+            <p:ph type="subTitle" idx="1"/>
           </p:nvPr>
         </p:nvSpPr>
         <p:spPr/>
@@ -43297,20 +43401,9 @@
           <a:bodyPr/>
           <a:lstStyle/>
           <a:p>
-            <a:pPr marL="0" indent="0">
-              <a:buNone/>
-            </a:pPr>
             <a:r>
               <a:rPr lang="en-US" dirty="0"/>
-              <a:t>If necessary, make your own slides to cover topic students struggle with during the Magpie </a:t>
-            </a:r>
-            <a:r>
-              <a:rPr lang="en-US" dirty="0" err="1"/>
-              <a:t>Chatbot</a:t>
-            </a:r>
-            <a:r>
-              <a:rPr lang="en-US" dirty="0"/>
-              <a:t> lab.</a:t>
+              <a:t>[ 4.09 ] [ Today’s Date ] [ Instructor Name ]</a:t>
             </a:r>
           </a:p>
         </p:txBody>
@@ -43318,7 +43411,7 @@
     </p:spTree>
     <p:extLst>
       <p:ext uri="{BB962C8B-B14F-4D97-AF65-F5344CB8AC3E}">
-        <p14:creationId xmlns:p14="http://schemas.microsoft.com/office/powerpoint/2010/main" val="4082605245"/>
+        <p14:creationId xmlns:p14="http://schemas.microsoft.com/office/powerpoint/2010/main" val="781799513"/>
       </p:ext>
     </p:extLst>
   </p:cSld>
@@ -43352,6 +43445,96 @@
             <a:spLocks noGrp="1"/>
           </p:cNvSpPr>
           <p:nvPr>
+            <p:ph type="title"/>
+          </p:nvPr>
+        </p:nvSpPr>
+        <p:spPr/>
+        <p:txBody>
+          <a:bodyPr/>
+          <a:lstStyle/>
+          <a:p>
+            <a:r>
+              <a:rPr lang="en-US" dirty="0"/>
+              <a:t>Empty </a:t>
+            </a:r>
+            <a:r>
+              <a:rPr lang="en-US" dirty="0" err="1"/>
+              <a:t>Powerpoint</a:t>
+            </a:r>
+            <a:endParaRPr lang="en-US" dirty="0"/>
+          </a:p>
+        </p:txBody>
+      </p:sp>
+      <p:sp>
+        <p:nvSpPr>
+          <p:cNvPr id="3" name="Content Placeholder 2"/>
+          <p:cNvSpPr>
+            <a:spLocks noGrp="1"/>
+          </p:cNvSpPr>
+          <p:nvPr>
+            <p:ph idx="1"/>
+          </p:nvPr>
+        </p:nvSpPr>
+        <p:spPr/>
+        <p:txBody>
+          <a:bodyPr/>
+          <a:lstStyle/>
+          <a:p>
+            <a:pPr marL="0" indent="0">
+              <a:buNone/>
+            </a:pPr>
+            <a:r>
+              <a:rPr lang="en-US" dirty="0"/>
+              <a:t>If necessary, make your own slides to cover topic students struggle with during the Magpie </a:t>
+            </a:r>
+            <a:r>
+              <a:rPr lang="en-US" dirty="0" err="1"/>
+              <a:t>Chatbot</a:t>
+            </a:r>
+            <a:r>
+              <a:rPr lang="en-US" dirty="0"/>
+              <a:t> lab.</a:t>
+            </a:r>
+          </a:p>
+        </p:txBody>
+      </p:sp>
+    </p:spTree>
+    <p:extLst>
+      <p:ext uri="{BB962C8B-B14F-4D97-AF65-F5344CB8AC3E}">
+        <p14:creationId xmlns:p14="http://schemas.microsoft.com/office/powerpoint/2010/main" val="4082605245"/>
+      </p:ext>
+    </p:extLst>
+  </p:cSld>
+  <p:clrMapOvr>
+    <a:masterClrMapping/>
+  </p:clrMapOvr>
+</p:sld>
+</file>
+
+<file path=ppt/slides/slide75.xml><?xml version="1.0" encoding="utf-8"?>
+<p:sld xmlns:a="http://schemas.openxmlformats.org/drawingml/2006/main" xmlns:r="http://schemas.openxmlformats.org/officeDocument/2006/relationships" xmlns:p="http://schemas.openxmlformats.org/presentationml/2006/main">
+  <p:cSld>
+    <p:spTree>
+      <p:nvGrpSpPr>
+        <p:cNvPr id="1" name=""/>
+        <p:cNvGrpSpPr/>
+        <p:nvPr/>
+      </p:nvGrpSpPr>
+      <p:grpSpPr>
+        <a:xfrm>
+          <a:off x="0" y="0"/>
+          <a:ext cx="0" cy="0"/>
+          <a:chOff x="0" y="0"/>
+          <a:chExt cx="0" cy="0"/>
+        </a:xfrm>
+      </p:grpSpPr>
+      <p:sp>
+        <p:nvSpPr>
+          <p:cNvPr id="2" name="Title 1"/>
+          <p:cNvSpPr>
+            <a:spLocks noGrp="1"/>
+          </p:cNvSpPr>
+          <p:nvPr>
             <p:ph type="ctrTitle"/>
           </p:nvPr>
         </p:nvSpPr>
@@ -43404,7 +43587,7 @@
 </p:sld>
 </file>
 
-<file path=ppt/slides/slide75.xml><?xml version="1.0" encoding="utf-8"?>
+<file path=ppt/slides/slide76.xml><?xml version="1.0" encoding="utf-8"?>
 <p:sld xmlns:a="http://schemas.openxmlformats.org/drawingml/2006/main" xmlns:r="http://schemas.openxmlformats.org/officeDocument/2006/relationships" xmlns:p="http://schemas.openxmlformats.org/presentationml/2006/main">
   <p:cSld>
     <p:spTree>
@@ -43463,7 +43646,7 @@
 </p:sld>
 </file>
 
-<file path=ppt/slides/slide76.xml><?xml version="1.0" encoding="utf-8"?>
+<file path=ppt/slides/slide77.xml><?xml version="1.0" encoding="utf-8"?>
 <p:sld xmlns:a="http://schemas.openxmlformats.org/drawingml/2006/main" xmlns:r="http://schemas.openxmlformats.org/officeDocument/2006/relationships" xmlns:p="http://schemas.openxmlformats.org/presentationml/2006/main">
   <p:cSld>
     <p:spTree>
@@ -43522,7 +43705,7 @@
 </p:sld>
 </file>
 
-<file path=ppt/slides/slide77.xml><?xml version="1.0" encoding="utf-8"?>
+<file path=ppt/slides/slide78.xml><?xml version="1.0" encoding="utf-8"?>
 <p:sld xmlns:a="http://schemas.openxmlformats.org/drawingml/2006/main" xmlns:r="http://schemas.openxmlformats.org/officeDocument/2006/relationships" xmlns:p="http://schemas.openxmlformats.org/presentationml/2006/main">
   <p:cSld>
     <p:spTree>
@@ -43614,7 +43797,7 @@
 </p:sld>
 </file>
 
-<file path=ppt/slides/slide78.xml><?xml version="1.0" encoding="utf-8"?>
+<file path=ppt/slides/slide79.xml><?xml version="1.0" encoding="utf-8"?>
 <p:sld xmlns:a="http://schemas.openxmlformats.org/drawingml/2006/main" xmlns:r="http://schemas.openxmlformats.org/officeDocument/2006/relationships" xmlns:p="http://schemas.openxmlformats.org/presentationml/2006/main">
   <p:cSld>
     <p:spTree>
@@ -44474,21 +44657,6 @@
 </file>
 
 <file path=customXml/item1.xml><?xml version="1.0" encoding="utf-8"?>
-<?mso-contentType ?>
-<FormTemplates xmlns="http://schemas.microsoft.com/sharepoint/v3/contenttype/forms">
-  <Display>DocumentLibraryForm</Display>
-  <Edit>DocumentLibraryForm</Edit>
-  <New>DocumentLibraryForm</New>
-</FormTemplates>
-</file>
-
-<file path=customXml/item2.xml><?xml version="1.0" encoding="utf-8"?>
-<p:properties xmlns:p="http://schemas.microsoft.com/office/2006/metadata/properties" xmlns:xsi="http://www.w3.org/2001/XMLSchema-instance" xmlns:pc="http://schemas.microsoft.com/office/infopath/2007/PartnerControls">
-  <documentManagement/>
-</p:properties>
-</file>
-
-<file path=customXml/item3.xml><?xml version="1.0" encoding="utf-8"?>
 <ct:contentTypeSchema xmlns:ct="http://schemas.microsoft.com/office/2006/metadata/contentType" xmlns:ma="http://schemas.microsoft.com/office/2006/metadata/properties/metaAttributes" ct:_="" ma:_="" ma:contentTypeName="Document" ma:contentTypeID="0x010100BABADD3A0624AA4E97287821B8F4D7D6" ma:contentTypeVersion="3" ma:contentTypeDescription="Create a new document." ma:contentTypeScope="" ma:versionID="d1f55a70bd1930e0ae5c5588ea58d234">
   <xsd:schema xmlns:xsd="http://www.w3.org/2001/XMLSchema" xmlns:xs="http://www.w3.org/2001/XMLSchema" xmlns:p="http://schemas.microsoft.com/office/2006/metadata/properties" xmlns:ns2="5edd459b-714d-42ed-b78f-512da7d1c14e" targetNamespace="http://schemas.microsoft.com/office/2006/metadata/properties" ma:root="true" ma:fieldsID="5a6a6e2895642296b7d1775ae73bc200" ns2:_="">
     <xsd:import namespace="5edd459b-714d-42ed-b78f-512da7d1c14e"/>
@@ -44642,31 +44810,22 @@
 </ct:contentTypeSchema>
 </file>
 
-<file path=customXml/itemProps1.xml><?xml version="1.0" encoding="utf-8"?>
-<ds:datastoreItem xmlns:ds="http://schemas.openxmlformats.org/officeDocument/2006/customXml" ds:itemID="{7214D5E7-D1A3-4AD8-9DF2-B5EBCFE58B85}">
-  <ds:schemaRefs>
-    <ds:schemaRef ds:uri="http://schemas.microsoft.com/sharepoint/v3/contenttype/forms"/>
-  </ds:schemaRefs>
-</ds:datastoreItem>
+<file path=customXml/item2.xml><?xml version="1.0" encoding="utf-8"?>
+<?mso-contentType ?>
+<FormTemplates xmlns="http://schemas.microsoft.com/sharepoint/v3/contenttype/forms">
+  <Display>DocumentLibraryForm</Display>
+  <Edit>DocumentLibraryForm</Edit>
+  <New>DocumentLibraryForm</New>
+</FormTemplates>
 </file>
 
-<file path=customXml/itemProps2.xml><?xml version="1.0" encoding="utf-8"?>
-<ds:datastoreItem xmlns:ds="http://schemas.openxmlformats.org/officeDocument/2006/customXml" ds:itemID="{1FC66F77-93BD-41FC-BCD6-478E52446EDA}">
-  <ds:schemaRefs>
-    <ds:schemaRef ds:uri="5edd459b-714d-42ed-b78f-512da7d1c14e"/>
-    <ds:schemaRef ds:uri="http://purl.org/dc/dcmitype/"/>
-    <ds:schemaRef ds:uri="http://schemas.microsoft.com/office/2006/documentManagement/types"/>
-    <ds:schemaRef ds:uri="http://purl.org/dc/elements/1.1/"/>
-    <ds:schemaRef ds:uri="http://schemas.microsoft.com/office/2006/metadata/properties"/>
-    <ds:schemaRef ds:uri="http://purl.org/dc/terms/"/>
-    <ds:schemaRef ds:uri="http://schemas.openxmlformats.org/package/2006/metadata/core-properties"/>
-    <ds:schemaRef ds:uri="http://schemas.microsoft.com/office/infopath/2007/PartnerControls"/>
-    <ds:schemaRef ds:uri="http://www.w3.org/XML/1998/namespace"/>
-  </ds:schemaRefs>
-</ds:datastoreItem>
+<file path=customXml/item3.xml><?xml version="1.0" encoding="utf-8"?>
+<p:properties xmlns:p="http://schemas.microsoft.com/office/2006/metadata/properties" xmlns:xsi="http://www.w3.org/2001/XMLSchema-instance" xmlns:pc="http://schemas.microsoft.com/office/infopath/2007/PartnerControls">
+  <documentManagement/>
+</p:properties>
 </file>
 
-<file path=customXml/itemProps3.xml><?xml version="1.0" encoding="utf-8"?>
+<file path=customXml/itemProps1.xml><?xml version="1.0" encoding="utf-8"?>
 <ds:datastoreItem xmlns:ds="http://schemas.openxmlformats.org/officeDocument/2006/customXml" ds:itemID="{6D92D80B-5E3D-4520-BB40-B82F31EFEAAA}">
   <ds:schemaRefs>
     <ds:schemaRef ds:uri="http://schemas.microsoft.com/office/2006/metadata/contentType"/>
@@ -44682,4 +44841,28 @@
     <ds:schemaRef ds:uri="http://schemas.microsoft.com/internal/obd"/>
   </ds:schemaRefs>
 </ds:datastoreItem>
+</file>
+
+<file path=customXml/itemProps2.xml><?xml version="1.0" encoding="utf-8"?>
+<ds:datastoreItem xmlns:ds="http://schemas.openxmlformats.org/officeDocument/2006/customXml" ds:itemID="{7214D5E7-D1A3-4AD8-9DF2-B5EBCFE58B85}">
+  <ds:schemaRefs>
+    <ds:schemaRef ds:uri="http://schemas.microsoft.com/sharepoint/v3/contenttype/forms"/>
+  </ds:schemaRefs>
+</ds:datastoreItem>
+</file>
+
+<file path=customXml/itemProps3.xml><?xml version="1.0" encoding="utf-8"?>
+<ds:datastoreItem xmlns:ds="http://schemas.openxmlformats.org/officeDocument/2006/customXml" ds:itemID="{1FC66F77-93BD-41FC-BCD6-478E52446EDA}">
+  <ds:schemaRefs>
+    <ds:schemaRef ds:uri="5edd459b-714d-42ed-b78f-512da7d1c14e"/>
+    <ds:schemaRef ds:uri="http://purl.org/dc/dcmitype/"/>
+    <ds:schemaRef ds:uri="http://schemas.microsoft.com/office/2006/documentManagement/types"/>
+    <ds:schemaRef ds:uri="http://purl.org/dc/elements/1.1/"/>
+    <ds:schemaRef ds:uri="http://schemas.microsoft.com/office/2006/metadata/properties"/>
+    <ds:schemaRef ds:uri="http://purl.org/dc/terms/"/>
+    <ds:schemaRef ds:uri="http://schemas.openxmlformats.org/package/2006/metadata/core-properties"/>
+    <ds:schemaRef ds:uri="http://schemas.microsoft.com/office/infopath/2007/PartnerControls"/>
+    <ds:schemaRef ds:uri="http://www.w3.org/XML/1998/namespace"/>
+  </ds:schemaRefs>
+</ds:datastoreItem>
 </file>
</xml_diff>